<commit_message>
Trabajo en la ppt final
</commit_message>
<xml_diff>
--- a/Pres Capstone MBunster.pptx
+++ b/Pres Capstone MBunster.pptx
@@ -4,8 +4,18 @@
   <p:sldMasterIdLst>
     <p:sldMasterId id="2147483648" r:id="rId1"/>
   </p:sldMasterIdLst>
+  <p:notesMasterIdLst>
+    <p:notesMasterId r:id="rId10"/>
+  </p:notesMasterIdLst>
   <p:sldIdLst>
     <p:sldId id="256" r:id="rId2"/>
+    <p:sldId id="257" r:id="rId3"/>
+    <p:sldId id="261" r:id="rId4"/>
+    <p:sldId id="262" r:id="rId5"/>
+    <p:sldId id="263" r:id="rId6"/>
+    <p:sldId id="258" r:id="rId7"/>
+    <p:sldId id="259" r:id="rId8"/>
+    <p:sldId id="260" r:id="rId9"/>
   </p:sldIdLst>
   <p:sldSz cx="12192000" cy="6858000"/>
   <p:notesSz cx="6858000" cy="9144000"/>
@@ -104,7 +114,560 @@
       </a:defRPr>
     </a:lvl9pPr>
   </p:defaultTextStyle>
+  <p:extLst>
+    <p:ext uri="{EFAFB233-063F-42B5-8137-9DF3F51BA10A}">
+      <p15:sldGuideLst xmlns:p15="http://schemas.microsoft.com/office/powerpoint/2012/main"/>
+    </p:ext>
+  </p:extLst>
 </p:presentation>
+</file>
+
+<file path=ppt/notesMasters/notesMaster1.xml><?xml version="1.0" encoding="utf-8"?>
+<p:notesMaster xmlns:a="http://schemas.openxmlformats.org/drawingml/2006/main" xmlns:r="http://schemas.openxmlformats.org/officeDocument/2006/relationships" xmlns:p="http://schemas.openxmlformats.org/presentationml/2006/main">
+  <p:cSld>
+    <p:bg>
+      <p:bgRef idx="1001">
+        <a:schemeClr val="bg1"/>
+      </p:bgRef>
+    </p:bg>
+    <p:spTree>
+      <p:nvGrpSpPr>
+        <p:cNvPr id="1" name=""/>
+        <p:cNvGrpSpPr/>
+        <p:nvPr/>
+      </p:nvGrpSpPr>
+      <p:grpSpPr>
+        <a:xfrm>
+          <a:off x="0" y="0"/>
+          <a:ext cx="0" cy="0"/>
+          <a:chOff x="0" y="0"/>
+          <a:chExt cx="0" cy="0"/>
+        </a:xfrm>
+      </p:grpSpPr>
+      <p:sp>
+        <p:nvSpPr>
+          <p:cNvPr id="2" name="Header Placeholder 1"/>
+          <p:cNvSpPr>
+            <a:spLocks noGrp="1"/>
+          </p:cNvSpPr>
+          <p:nvPr>
+            <p:ph type="hdr" sz="quarter"/>
+          </p:nvPr>
+        </p:nvSpPr>
+        <p:spPr>
+          <a:xfrm>
+            <a:off x="0" y="0"/>
+            <a:ext cx="2971800" cy="458788"/>
+          </a:xfrm>
+          <a:prstGeom prst="rect">
+            <a:avLst/>
+          </a:prstGeom>
+        </p:spPr>
+        <p:txBody>
+          <a:bodyPr vert="horz" lIns="91440" tIns="45720" rIns="91440" bIns="45720" rtlCol="0"/>
+          <a:lstStyle>
+            <a:lvl1pPr algn="l">
+              <a:defRPr sz="1200"/>
+            </a:lvl1pPr>
+          </a:lstStyle>
+          <a:p>
+            <a:endParaRPr lang="es-ES_tradnl"/>
+          </a:p>
+        </p:txBody>
+      </p:sp>
+      <p:sp>
+        <p:nvSpPr>
+          <p:cNvPr id="3" name="Date Placeholder 2"/>
+          <p:cNvSpPr>
+            <a:spLocks noGrp="1"/>
+          </p:cNvSpPr>
+          <p:nvPr>
+            <p:ph type="dt" idx="1"/>
+          </p:nvPr>
+        </p:nvSpPr>
+        <p:spPr>
+          <a:xfrm>
+            <a:off x="3884613" y="0"/>
+            <a:ext cx="2971800" cy="458788"/>
+          </a:xfrm>
+          <a:prstGeom prst="rect">
+            <a:avLst/>
+          </a:prstGeom>
+        </p:spPr>
+        <p:txBody>
+          <a:bodyPr vert="horz" lIns="91440" tIns="45720" rIns="91440" bIns="45720" rtlCol="0"/>
+          <a:lstStyle>
+            <a:lvl1pPr algn="r">
+              <a:defRPr sz="1200"/>
+            </a:lvl1pPr>
+          </a:lstStyle>
+          <a:p>
+            <a:fld id="{8C78EFD9-6385-A64D-B41D-68AAFDF176E3}" type="datetimeFigureOut">
+              <a:rPr lang="es-ES_tradnl" smtClean="0"/>
+              <a:t>13/1/25</a:t>
+            </a:fld>
+            <a:endParaRPr lang="es-ES_tradnl"/>
+          </a:p>
+        </p:txBody>
+      </p:sp>
+      <p:sp>
+        <p:nvSpPr>
+          <p:cNvPr id="4" name="Slide Image Placeholder 3"/>
+          <p:cNvSpPr>
+            <a:spLocks noGrp="1" noRot="1" noChangeAspect="1"/>
+          </p:cNvSpPr>
+          <p:nvPr>
+            <p:ph type="sldImg" idx="2"/>
+          </p:nvPr>
+        </p:nvSpPr>
+        <p:spPr>
+          <a:xfrm>
+            <a:off x="685800" y="1143000"/>
+            <a:ext cx="5486400" cy="3086100"/>
+          </a:xfrm>
+          <a:prstGeom prst="rect">
+            <a:avLst/>
+          </a:prstGeom>
+          <a:noFill/>
+          <a:ln w="12700">
+            <a:solidFill>
+              <a:prstClr val="black"/>
+            </a:solidFill>
+          </a:ln>
+        </p:spPr>
+        <p:txBody>
+          <a:bodyPr vert="horz" lIns="91440" tIns="45720" rIns="91440" bIns="45720" rtlCol="0" anchor="ctr"/>
+          <a:lstStyle/>
+          <a:p>
+            <a:endParaRPr lang="es-ES_tradnl"/>
+          </a:p>
+        </p:txBody>
+      </p:sp>
+      <p:sp>
+        <p:nvSpPr>
+          <p:cNvPr id="5" name="Notes Placeholder 4"/>
+          <p:cNvSpPr>
+            <a:spLocks noGrp="1"/>
+          </p:cNvSpPr>
+          <p:nvPr>
+            <p:ph type="body" sz="quarter" idx="3"/>
+          </p:nvPr>
+        </p:nvSpPr>
+        <p:spPr>
+          <a:xfrm>
+            <a:off x="685800" y="4400550"/>
+            <a:ext cx="5486400" cy="3600450"/>
+          </a:xfrm>
+          <a:prstGeom prst="rect">
+            <a:avLst/>
+          </a:prstGeom>
+        </p:spPr>
+        <p:txBody>
+          <a:bodyPr vert="horz" lIns="91440" tIns="45720" rIns="91440" bIns="45720" rtlCol="0"/>
+          <a:lstStyle/>
+          <a:p>
+            <a:pPr lvl="0"/>
+            <a:r>
+              <a:rPr lang="en-US"/>
+              <a:t>Click to edit Master text styles</a:t>
+            </a:r>
+          </a:p>
+          <a:p>
+            <a:pPr lvl="1"/>
+            <a:r>
+              <a:rPr lang="en-US"/>
+              <a:t>Second level</a:t>
+            </a:r>
+          </a:p>
+          <a:p>
+            <a:pPr lvl="2"/>
+            <a:r>
+              <a:rPr lang="en-US"/>
+              <a:t>Third level</a:t>
+            </a:r>
+          </a:p>
+          <a:p>
+            <a:pPr lvl="3"/>
+            <a:r>
+              <a:rPr lang="en-US"/>
+              <a:t>Fourth level</a:t>
+            </a:r>
+          </a:p>
+          <a:p>
+            <a:pPr lvl="4"/>
+            <a:r>
+              <a:rPr lang="en-US"/>
+              <a:t>Fifth level</a:t>
+            </a:r>
+            <a:endParaRPr lang="es-ES_tradnl"/>
+          </a:p>
+        </p:txBody>
+      </p:sp>
+      <p:sp>
+        <p:nvSpPr>
+          <p:cNvPr id="6" name="Footer Placeholder 5"/>
+          <p:cNvSpPr>
+            <a:spLocks noGrp="1"/>
+          </p:cNvSpPr>
+          <p:nvPr>
+            <p:ph type="ftr" sz="quarter" idx="4"/>
+          </p:nvPr>
+        </p:nvSpPr>
+        <p:spPr>
+          <a:xfrm>
+            <a:off x="0" y="8685213"/>
+            <a:ext cx="2971800" cy="458787"/>
+          </a:xfrm>
+          <a:prstGeom prst="rect">
+            <a:avLst/>
+          </a:prstGeom>
+        </p:spPr>
+        <p:txBody>
+          <a:bodyPr vert="horz" lIns="91440" tIns="45720" rIns="91440" bIns="45720" rtlCol="0" anchor="b"/>
+          <a:lstStyle>
+            <a:lvl1pPr algn="l">
+              <a:defRPr sz="1200"/>
+            </a:lvl1pPr>
+          </a:lstStyle>
+          <a:p>
+            <a:endParaRPr lang="es-ES_tradnl"/>
+          </a:p>
+        </p:txBody>
+      </p:sp>
+      <p:sp>
+        <p:nvSpPr>
+          <p:cNvPr id="7" name="Slide Number Placeholder 6"/>
+          <p:cNvSpPr>
+            <a:spLocks noGrp="1"/>
+          </p:cNvSpPr>
+          <p:nvPr>
+            <p:ph type="sldNum" sz="quarter" idx="5"/>
+          </p:nvPr>
+        </p:nvSpPr>
+        <p:spPr>
+          <a:xfrm>
+            <a:off x="3884613" y="8685213"/>
+            <a:ext cx="2971800" cy="458787"/>
+          </a:xfrm>
+          <a:prstGeom prst="rect">
+            <a:avLst/>
+          </a:prstGeom>
+        </p:spPr>
+        <p:txBody>
+          <a:bodyPr vert="horz" lIns="91440" tIns="45720" rIns="91440" bIns="45720" rtlCol="0" anchor="b"/>
+          <a:lstStyle>
+            <a:lvl1pPr algn="r">
+              <a:defRPr sz="1200"/>
+            </a:lvl1pPr>
+          </a:lstStyle>
+          <a:p>
+            <a:fld id="{80F3C983-7984-F64B-9B65-F1FE3A074B8B}" type="slidenum">
+              <a:rPr lang="es-ES_tradnl" smtClean="0"/>
+              <a:t>‹#›</a:t>
+            </a:fld>
+            <a:endParaRPr lang="es-ES_tradnl"/>
+          </a:p>
+        </p:txBody>
+      </p:sp>
+    </p:spTree>
+    <p:extLst>
+      <p:ext uri="{BB962C8B-B14F-4D97-AF65-F5344CB8AC3E}">
+        <p14:creationId xmlns:p14="http://schemas.microsoft.com/office/powerpoint/2010/main" val="40438545"/>
+      </p:ext>
+    </p:extLst>
+  </p:cSld>
+  <p:clrMap bg1="lt1" tx1="dk1" bg2="lt2" tx2="dk2" accent1="accent1" accent2="accent2" accent3="accent3" accent4="accent4" accent5="accent5" accent6="accent6" hlink="hlink" folHlink="folHlink"/>
+  <p:notesStyle>
+    <a:lvl1pPr marL="0" algn="l" defTabSz="914400" rtl="0" eaLnBrk="1" latinLnBrk="0" hangingPunct="1">
+      <a:defRPr sz="1200" kern="1200">
+        <a:solidFill>
+          <a:schemeClr val="tx1"/>
+        </a:solidFill>
+        <a:latin typeface="+mn-lt"/>
+        <a:ea typeface="+mn-ea"/>
+        <a:cs typeface="+mn-cs"/>
+      </a:defRPr>
+    </a:lvl1pPr>
+    <a:lvl2pPr marL="457200" algn="l" defTabSz="914400" rtl="0" eaLnBrk="1" latinLnBrk="0" hangingPunct="1">
+      <a:defRPr sz="1200" kern="1200">
+        <a:solidFill>
+          <a:schemeClr val="tx1"/>
+        </a:solidFill>
+        <a:latin typeface="+mn-lt"/>
+        <a:ea typeface="+mn-ea"/>
+        <a:cs typeface="+mn-cs"/>
+      </a:defRPr>
+    </a:lvl2pPr>
+    <a:lvl3pPr marL="914400" algn="l" defTabSz="914400" rtl="0" eaLnBrk="1" latinLnBrk="0" hangingPunct="1">
+      <a:defRPr sz="1200" kern="1200">
+        <a:solidFill>
+          <a:schemeClr val="tx1"/>
+        </a:solidFill>
+        <a:latin typeface="+mn-lt"/>
+        <a:ea typeface="+mn-ea"/>
+        <a:cs typeface="+mn-cs"/>
+      </a:defRPr>
+    </a:lvl3pPr>
+    <a:lvl4pPr marL="1371600" algn="l" defTabSz="914400" rtl="0" eaLnBrk="1" latinLnBrk="0" hangingPunct="1">
+      <a:defRPr sz="1200" kern="1200">
+        <a:solidFill>
+          <a:schemeClr val="tx1"/>
+        </a:solidFill>
+        <a:latin typeface="+mn-lt"/>
+        <a:ea typeface="+mn-ea"/>
+        <a:cs typeface="+mn-cs"/>
+      </a:defRPr>
+    </a:lvl4pPr>
+    <a:lvl5pPr marL="1828800" algn="l" defTabSz="914400" rtl="0" eaLnBrk="1" latinLnBrk="0" hangingPunct="1">
+      <a:defRPr sz="1200" kern="1200">
+        <a:solidFill>
+          <a:schemeClr val="tx1"/>
+        </a:solidFill>
+        <a:latin typeface="+mn-lt"/>
+        <a:ea typeface="+mn-ea"/>
+        <a:cs typeface="+mn-cs"/>
+      </a:defRPr>
+    </a:lvl5pPr>
+    <a:lvl6pPr marL="2286000" algn="l" defTabSz="914400" rtl="0" eaLnBrk="1" latinLnBrk="0" hangingPunct="1">
+      <a:defRPr sz="1200" kern="1200">
+        <a:solidFill>
+          <a:schemeClr val="tx1"/>
+        </a:solidFill>
+        <a:latin typeface="+mn-lt"/>
+        <a:ea typeface="+mn-ea"/>
+        <a:cs typeface="+mn-cs"/>
+      </a:defRPr>
+    </a:lvl6pPr>
+    <a:lvl7pPr marL="2743200" algn="l" defTabSz="914400" rtl="0" eaLnBrk="1" latinLnBrk="0" hangingPunct="1">
+      <a:defRPr sz="1200" kern="1200">
+        <a:solidFill>
+          <a:schemeClr val="tx1"/>
+        </a:solidFill>
+        <a:latin typeface="+mn-lt"/>
+        <a:ea typeface="+mn-ea"/>
+        <a:cs typeface="+mn-cs"/>
+      </a:defRPr>
+    </a:lvl7pPr>
+    <a:lvl8pPr marL="3200400" algn="l" defTabSz="914400" rtl="0" eaLnBrk="1" latinLnBrk="0" hangingPunct="1">
+      <a:defRPr sz="1200" kern="1200">
+        <a:solidFill>
+          <a:schemeClr val="tx1"/>
+        </a:solidFill>
+        <a:latin typeface="+mn-lt"/>
+        <a:ea typeface="+mn-ea"/>
+        <a:cs typeface="+mn-cs"/>
+      </a:defRPr>
+    </a:lvl8pPr>
+    <a:lvl9pPr marL="3657600" algn="l" defTabSz="914400" rtl="0" eaLnBrk="1" latinLnBrk="0" hangingPunct="1">
+      <a:defRPr sz="1200" kern="1200">
+        <a:solidFill>
+          <a:schemeClr val="tx1"/>
+        </a:solidFill>
+        <a:latin typeface="+mn-lt"/>
+        <a:ea typeface="+mn-ea"/>
+        <a:cs typeface="+mn-cs"/>
+      </a:defRPr>
+    </a:lvl9pPr>
+  </p:notesStyle>
+</p:notesMaster>
+</file>
+
+<file path=ppt/notesSlides/notesSlide1.xml><?xml version="1.0" encoding="utf-8"?>
+<p:notes xmlns:a="http://schemas.openxmlformats.org/drawingml/2006/main" xmlns:r="http://schemas.openxmlformats.org/officeDocument/2006/relationships" xmlns:p="http://schemas.openxmlformats.org/presentationml/2006/main">
+  <p:cSld>
+    <p:spTree>
+      <p:nvGrpSpPr>
+        <p:cNvPr id="1" name=""/>
+        <p:cNvGrpSpPr/>
+        <p:nvPr/>
+      </p:nvGrpSpPr>
+      <p:grpSpPr>
+        <a:xfrm>
+          <a:off x="0" y="0"/>
+          <a:ext cx="0" cy="0"/>
+          <a:chOff x="0" y="0"/>
+          <a:chExt cx="0" cy="0"/>
+        </a:xfrm>
+      </p:grpSpPr>
+      <p:sp>
+        <p:nvSpPr>
+          <p:cNvPr id="2" name="Slide Image Placeholder 1"/>
+          <p:cNvSpPr>
+            <a:spLocks noGrp="1" noRot="1" noChangeAspect="1"/>
+          </p:cNvSpPr>
+          <p:nvPr>
+            <p:ph type="sldImg"/>
+          </p:nvPr>
+        </p:nvSpPr>
+        <p:spPr/>
+      </p:sp>
+      <p:sp>
+        <p:nvSpPr>
+          <p:cNvPr id="3" name="Notes Placeholder 2"/>
+          <p:cNvSpPr>
+            <a:spLocks noGrp="1"/>
+          </p:cNvSpPr>
+          <p:nvPr>
+            <p:ph type="body" idx="1"/>
+          </p:nvPr>
+        </p:nvSpPr>
+        <p:spPr/>
+        <p:txBody>
+          <a:bodyPr/>
+          <a:lstStyle/>
+          <a:p>
+            <a:r>
+              <a:rPr lang="es-ES_tradnl" dirty="0"/>
+              <a:t> </a:t>
+            </a:r>
+          </a:p>
+        </p:txBody>
+      </p:sp>
+      <p:sp>
+        <p:nvSpPr>
+          <p:cNvPr id="4" name="Slide Number Placeholder 3"/>
+          <p:cNvSpPr>
+            <a:spLocks noGrp="1"/>
+          </p:cNvSpPr>
+          <p:nvPr>
+            <p:ph type="sldNum" sz="quarter" idx="5"/>
+          </p:nvPr>
+        </p:nvSpPr>
+        <p:spPr/>
+        <p:txBody>
+          <a:bodyPr/>
+          <a:lstStyle/>
+          <a:p>
+            <a:fld id="{80F3C983-7984-F64B-9B65-F1FE3A074B8B}" type="slidenum">
+              <a:rPr lang="es-ES_tradnl" smtClean="0"/>
+              <a:t>4</a:t>
+            </a:fld>
+            <a:endParaRPr lang="es-ES_tradnl"/>
+          </a:p>
+        </p:txBody>
+      </p:sp>
+    </p:spTree>
+    <p:extLst>
+      <p:ext uri="{BB962C8B-B14F-4D97-AF65-F5344CB8AC3E}">
+        <p14:creationId xmlns:p14="http://schemas.microsoft.com/office/powerpoint/2010/main" val="766767142"/>
+      </p:ext>
+    </p:extLst>
+  </p:cSld>
+  <p:clrMapOvr>
+    <a:masterClrMapping/>
+  </p:clrMapOvr>
+</p:notes>
+</file>
+
+<file path=ppt/notesSlides/notesSlide2.xml><?xml version="1.0" encoding="utf-8"?>
+<p:notes xmlns:a="http://schemas.openxmlformats.org/drawingml/2006/main" xmlns:r="http://schemas.openxmlformats.org/officeDocument/2006/relationships" xmlns:p="http://schemas.openxmlformats.org/presentationml/2006/main">
+  <p:cSld>
+    <p:spTree>
+      <p:nvGrpSpPr>
+        <p:cNvPr id="1" name="">
+          <a:extLst>
+            <a:ext uri="{FF2B5EF4-FFF2-40B4-BE49-F238E27FC236}">
+              <a16:creationId xmlns:a16="http://schemas.microsoft.com/office/drawing/2014/main" id="{0E9EF486-63B7-C619-0676-BBCD80E67855}"/>
+            </a:ext>
+          </a:extLst>
+        </p:cNvPr>
+        <p:cNvGrpSpPr/>
+        <p:nvPr/>
+      </p:nvGrpSpPr>
+      <p:grpSpPr>
+        <a:xfrm>
+          <a:off x="0" y="0"/>
+          <a:ext cx="0" cy="0"/>
+          <a:chOff x="0" y="0"/>
+          <a:chExt cx="0" cy="0"/>
+        </a:xfrm>
+      </p:grpSpPr>
+      <p:sp>
+        <p:nvSpPr>
+          <p:cNvPr id="2" name="Slide Image Placeholder 1">
+            <a:extLst>
+              <a:ext uri="{FF2B5EF4-FFF2-40B4-BE49-F238E27FC236}">
+                <a16:creationId xmlns:a16="http://schemas.microsoft.com/office/drawing/2014/main" id="{5812FFAF-88D9-9999-00A4-0E28655FD6D4}"/>
+              </a:ext>
+            </a:extLst>
+          </p:cNvPr>
+          <p:cNvSpPr>
+            <a:spLocks noGrp="1" noRot="1" noChangeAspect="1"/>
+          </p:cNvSpPr>
+          <p:nvPr>
+            <p:ph type="sldImg"/>
+          </p:nvPr>
+        </p:nvSpPr>
+        <p:spPr/>
+      </p:sp>
+      <p:sp>
+        <p:nvSpPr>
+          <p:cNvPr id="3" name="Notes Placeholder 2">
+            <a:extLst>
+              <a:ext uri="{FF2B5EF4-FFF2-40B4-BE49-F238E27FC236}">
+                <a16:creationId xmlns:a16="http://schemas.microsoft.com/office/drawing/2014/main" id="{AE508164-F916-A3A7-9F72-41D9B29BDCC8}"/>
+              </a:ext>
+            </a:extLst>
+          </p:cNvPr>
+          <p:cNvSpPr>
+            <a:spLocks noGrp="1"/>
+          </p:cNvSpPr>
+          <p:nvPr>
+            <p:ph type="body" idx="1"/>
+          </p:nvPr>
+        </p:nvSpPr>
+        <p:spPr/>
+        <p:txBody>
+          <a:bodyPr/>
+          <a:lstStyle/>
+          <a:p>
+            <a:r>
+              <a:rPr lang="es-ES_tradnl" dirty="0"/>
+              <a:t> </a:t>
+            </a:r>
+          </a:p>
+        </p:txBody>
+      </p:sp>
+      <p:sp>
+        <p:nvSpPr>
+          <p:cNvPr id="4" name="Slide Number Placeholder 3">
+            <a:extLst>
+              <a:ext uri="{FF2B5EF4-FFF2-40B4-BE49-F238E27FC236}">
+                <a16:creationId xmlns:a16="http://schemas.microsoft.com/office/drawing/2014/main" id="{AD3597F6-C624-2065-F8FC-4493324BC2A2}"/>
+              </a:ext>
+            </a:extLst>
+          </p:cNvPr>
+          <p:cNvSpPr>
+            <a:spLocks noGrp="1"/>
+          </p:cNvSpPr>
+          <p:nvPr>
+            <p:ph type="sldNum" sz="quarter" idx="5"/>
+          </p:nvPr>
+        </p:nvSpPr>
+        <p:spPr/>
+        <p:txBody>
+          <a:bodyPr/>
+          <a:lstStyle/>
+          <a:p>
+            <a:fld id="{80F3C983-7984-F64B-9B65-F1FE3A074B8B}" type="slidenum">
+              <a:rPr lang="es-ES_tradnl" smtClean="0"/>
+              <a:t>5</a:t>
+            </a:fld>
+            <a:endParaRPr lang="es-ES_tradnl"/>
+          </a:p>
+        </p:txBody>
+      </p:sp>
+    </p:spTree>
+    <p:extLst>
+      <p:ext uri="{BB962C8B-B14F-4D97-AF65-F5344CB8AC3E}">
+        <p14:creationId xmlns:p14="http://schemas.microsoft.com/office/powerpoint/2010/main" val="3661109323"/>
+      </p:ext>
+    </p:extLst>
+  </p:cSld>
+  <p:clrMapOvr>
+    <a:masterClrMapping/>
+  </p:clrMapOvr>
+</p:notes>
 </file>
 
 <file path=ppt/slideLayouts/slideLayout1.xml><?xml version="1.0" encoding="utf-8"?>
@@ -3371,7 +3934,7 @@
           <a:lstStyle/>
           <a:p>
             <a:r>
-              <a:rPr lang="en-CL" dirty="0"/>
+              <a:rPr lang="en-CL"/>
               <a:t>AGENDA CASPTONE</a:t>
             </a:r>
           </a:p>
@@ -3401,43 +3964,23 @@
         </p:spPr>
         <p:txBody>
           <a:bodyPr>
-            <a:normAutofit fontScale="70000" lnSpcReduction="20000"/>
+            <a:normAutofit fontScale="62500" lnSpcReduction="20000"/>
           </a:bodyPr>
           <a:lstStyle/>
           <a:p>
             <a:pPr algn="l"/>
             <a:r>
-              <a:rPr lang="en-US" b="1" i="0" u="none" strike="noStrike" dirty="0">
+              <a:rPr lang="es-ES_tradnl" b="1" i="0" u="none" strike="noStrike" dirty="0">
                 <a:solidFill>
                   <a:srgbClr val="444444"/>
                 </a:solidFill>
                 <a:effectLst/>
                 <a:latin typeface="Arial" panose="020B0604020202020204" pitchFamily="34" charset="0"/>
               </a:rPr>
-              <a:t>Primera </a:t>
-            </a:r>
-            <a:r>
-              <a:rPr lang="en-US" b="1" i="0" u="none" strike="noStrike" dirty="0" err="1">
-                <a:solidFill>
-                  <a:srgbClr val="444444"/>
-                </a:solidFill>
-                <a:effectLst/>
-                <a:latin typeface="Arial" panose="020B0604020202020204" pitchFamily="34" charset="0"/>
-              </a:rPr>
-              <a:t>parte</a:t>
-            </a:r>
-            <a:r>
-              <a:rPr lang="en-US" b="1" i="0" u="none" strike="noStrike" dirty="0">
-                <a:solidFill>
-                  <a:srgbClr val="444444"/>
-                </a:solidFill>
-                <a:effectLst/>
-                <a:latin typeface="Arial" panose="020B0604020202020204" pitchFamily="34" charset="0"/>
-              </a:rPr>
-              <a:t>:</a:t>
-            </a:r>
-            <a:r>
-              <a:rPr lang="en-US" b="0" i="0" u="none" strike="noStrike" dirty="0">
+              <a:t>Primera parte:</a:t>
+            </a:r>
+            <a:r>
+              <a:rPr lang="es-ES_tradnl" b="0" i="0" u="none" strike="noStrike" dirty="0">
                 <a:solidFill>
                   <a:srgbClr val="444444"/>
                 </a:solidFill>
@@ -3450,160 +3993,70 @@
           <a:p>
             <a:pPr algn="l"/>
             <a:r>
-              <a:rPr lang="en-US" b="0" i="0" u="none" strike="noStrike" dirty="0">
+              <a:rPr lang="es-ES_tradnl" b="0" i="0" u="none" strike="noStrike" dirty="0">
                 <a:solidFill>
                   <a:srgbClr val="444444"/>
                 </a:solidFill>
                 <a:effectLst/>
                 <a:latin typeface="Arial" panose="020B0604020202020204" pitchFamily="34" charset="0"/>
               </a:rPr>
-              <a:t>(</a:t>
-            </a:r>
-            <a:r>
-              <a:rPr lang="en-US" b="0" i="0" u="none" strike="noStrike" dirty="0" err="1">
+              <a:t>(Descripción del Contexto/Problema): Estado del arte + Planteamiento del Problema (4 minutos):</a:t>
+            </a:r>
+          </a:p>
+          <a:p>
+            <a:pPr algn="l"/>
+            <a:r>
+              <a:rPr lang="es-ES_tradnl" b="0" i="0" u="none" strike="noStrike" dirty="0">
                 <a:solidFill>
                   <a:srgbClr val="444444"/>
                 </a:solidFill>
                 <a:effectLst/>
                 <a:latin typeface="Arial" panose="020B0604020202020204" pitchFamily="34" charset="0"/>
               </a:rPr>
-              <a:t>Descripción</a:t>
-            </a:r>
-            <a:r>
-              <a:rPr lang="en-US" b="0" i="0" u="none" strike="noStrike" dirty="0">
+              <a:t>Identificar patrones</a:t>
+            </a:r>
+            <a:r>
+              <a:rPr lang="es-ES_tradnl" dirty="0">
+                <a:solidFill>
+                  <a:srgbClr val="444444"/>
+                </a:solidFill>
+                <a:latin typeface="Arial" panose="020B0604020202020204" pitchFamily="34" charset="0"/>
+              </a:rPr>
+              <a:t> comunes entre países tomando como base los </a:t>
+            </a:r>
+            <a:r>
+              <a:rPr lang="es-ES_tradnl" u="sng" dirty="0">
+                <a:solidFill>
+                  <a:srgbClr val="444444"/>
+                </a:solidFill>
+                <a:latin typeface="Arial" panose="020B0604020202020204" pitchFamily="34" charset="0"/>
+              </a:rPr>
+              <a:t>programas de gobierno</a:t>
+            </a:r>
+            <a:r>
+              <a:rPr lang="es-ES_tradnl" dirty="0">
+                <a:solidFill>
+                  <a:srgbClr val="444444"/>
+                </a:solidFill>
+                <a:latin typeface="Arial" panose="020B0604020202020204" pitchFamily="34" charset="0"/>
+              </a:rPr>
+              <a:t> de candidatos a la presidencia, que permita clasificarlos frente a la problemática común de la Corrupción.</a:t>
+            </a:r>
+            <a:r>
+              <a:rPr lang="es-ES_tradnl" b="0" i="0" u="none" strike="noStrike" dirty="0">
                 <a:solidFill>
                   <a:srgbClr val="444444"/>
                 </a:solidFill>
                 <a:effectLst/>
                 <a:latin typeface="Arial" panose="020B0604020202020204" pitchFamily="34" charset="0"/>
               </a:rPr>
-              <a:t> del </a:t>
-            </a:r>
-            <a:r>
-              <a:rPr lang="en-US" b="0" i="0" u="none" strike="noStrike" dirty="0" err="1">
-                <a:solidFill>
-                  <a:srgbClr val="444444"/>
-                </a:solidFill>
-                <a:effectLst/>
-                <a:latin typeface="Arial" panose="020B0604020202020204" pitchFamily="34" charset="0"/>
-              </a:rPr>
-              <a:t>Contexto</a:t>
-            </a:r>
-            <a:r>
-              <a:rPr lang="en-US" b="0" i="0" u="none" strike="noStrike" dirty="0">
-                <a:solidFill>
-                  <a:srgbClr val="444444"/>
-                </a:solidFill>
-                <a:effectLst/>
-                <a:latin typeface="Arial" panose="020B0604020202020204" pitchFamily="34" charset="0"/>
-              </a:rPr>
-              <a:t>/</a:t>
-            </a:r>
-            <a:r>
-              <a:rPr lang="en-US" b="0" i="0" u="none" strike="noStrike" dirty="0" err="1">
-                <a:solidFill>
-                  <a:srgbClr val="444444"/>
-                </a:solidFill>
-                <a:effectLst/>
-                <a:latin typeface="Arial" panose="020B0604020202020204" pitchFamily="34" charset="0"/>
-              </a:rPr>
-              <a:t>Problema</a:t>
-            </a:r>
-            <a:r>
-              <a:rPr lang="en-US" b="0" i="0" u="none" strike="noStrike" dirty="0">
-                <a:solidFill>
-                  <a:srgbClr val="444444"/>
-                </a:solidFill>
-                <a:effectLst/>
-                <a:latin typeface="Arial" panose="020B0604020202020204" pitchFamily="34" charset="0"/>
-              </a:rPr>
-              <a:t>): Estado del </a:t>
-            </a:r>
-            <a:r>
-              <a:rPr lang="en-US" b="0" i="0" u="none" strike="noStrike" dirty="0" err="1">
-                <a:solidFill>
-                  <a:srgbClr val="444444"/>
-                </a:solidFill>
-                <a:effectLst/>
-                <a:latin typeface="Arial" panose="020B0604020202020204" pitchFamily="34" charset="0"/>
-              </a:rPr>
-              <a:t>arte</a:t>
-            </a:r>
-            <a:r>
-              <a:rPr lang="en-US" b="0" i="0" u="none" strike="noStrike" dirty="0">
-                <a:solidFill>
-                  <a:srgbClr val="444444"/>
-                </a:solidFill>
-                <a:effectLst/>
-                <a:latin typeface="Arial" panose="020B0604020202020204" pitchFamily="34" charset="0"/>
-              </a:rPr>
-              <a:t> + </a:t>
-            </a:r>
-            <a:r>
-              <a:rPr lang="en-US" b="0" i="0" u="none" strike="noStrike" dirty="0" err="1">
-                <a:solidFill>
-                  <a:srgbClr val="444444"/>
-                </a:solidFill>
-                <a:effectLst/>
-                <a:latin typeface="Arial" panose="020B0604020202020204" pitchFamily="34" charset="0"/>
-              </a:rPr>
-              <a:t>Planteamiento</a:t>
-            </a:r>
-            <a:r>
-              <a:rPr lang="en-US" b="0" i="0" u="none" strike="noStrike" dirty="0">
-                <a:solidFill>
-                  <a:srgbClr val="444444"/>
-                </a:solidFill>
-                <a:effectLst/>
-                <a:latin typeface="Arial" panose="020B0604020202020204" pitchFamily="34" charset="0"/>
-              </a:rPr>
-              <a:t> del </a:t>
-            </a:r>
-            <a:r>
-              <a:rPr lang="en-US" b="0" i="0" u="none" strike="noStrike" dirty="0" err="1">
-                <a:solidFill>
-                  <a:srgbClr val="444444"/>
-                </a:solidFill>
-                <a:effectLst/>
-                <a:latin typeface="Arial" panose="020B0604020202020204" pitchFamily="34" charset="0"/>
-              </a:rPr>
-              <a:t>Problema</a:t>
-            </a:r>
-            <a:r>
-              <a:rPr lang="en-US" b="0" i="0" u="none" strike="noStrike" dirty="0">
-                <a:solidFill>
-                  <a:srgbClr val="444444"/>
-                </a:solidFill>
-                <a:effectLst/>
-                <a:latin typeface="Arial" panose="020B0604020202020204" pitchFamily="34" charset="0"/>
-              </a:rPr>
-              <a:t> (4 </a:t>
-            </a:r>
-            <a:r>
-              <a:rPr lang="en-US" b="0" i="0" u="none" strike="noStrike" dirty="0" err="1">
-                <a:solidFill>
-                  <a:srgbClr val="444444"/>
-                </a:solidFill>
-                <a:effectLst/>
-                <a:latin typeface="Arial" panose="020B0604020202020204" pitchFamily="34" charset="0"/>
-              </a:rPr>
-              <a:t>minutos</a:t>
-            </a:r>
-            <a:r>
-              <a:rPr lang="en-US" b="0" i="0" u="none" strike="noStrike" dirty="0">
-                <a:solidFill>
-                  <a:srgbClr val="444444"/>
-                </a:solidFill>
-                <a:effectLst/>
-                <a:latin typeface="Arial" panose="020B0604020202020204" pitchFamily="34" charset="0"/>
-              </a:rPr>
-              <a:t>)         </a:t>
+              <a:t>         </a:t>
             </a:r>
           </a:p>
           <a:p>
             <a:pPr algn="l"/>
             <a:r>
-              <a:rPr lang="en-US" b="0" i="0" u="none" strike="noStrike" dirty="0">
+              <a:rPr lang="es-ES_tradnl" b="0" i="0" u="none" strike="noStrike" dirty="0">
                 <a:solidFill>
                   <a:srgbClr val="444444"/>
                 </a:solidFill>
@@ -3616,37 +4069,17 @@
           <a:p>
             <a:pPr algn="l"/>
             <a:r>
-              <a:rPr lang="en-US" b="1" i="0" u="none" strike="noStrike" dirty="0">
+              <a:rPr lang="es-ES_tradnl" b="1" i="0" u="none" strike="noStrike" dirty="0">
                 <a:solidFill>
                   <a:srgbClr val="444444"/>
                 </a:solidFill>
                 <a:effectLst/>
                 <a:latin typeface="Arial" panose="020B0604020202020204" pitchFamily="34" charset="0"/>
               </a:rPr>
-              <a:t>Segunda </a:t>
-            </a:r>
-            <a:r>
-              <a:rPr lang="en-US" b="1" i="0" u="none" strike="noStrike" dirty="0" err="1">
-                <a:solidFill>
-                  <a:srgbClr val="444444"/>
-                </a:solidFill>
-                <a:effectLst/>
-                <a:latin typeface="Arial" panose="020B0604020202020204" pitchFamily="34" charset="0"/>
-              </a:rPr>
-              <a:t>parte</a:t>
-            </a:r>
-            <a:r>
-              <a:rPr lang="en-US" b="1" i="0" u="none" strike="noStrike" dirty="0">
-                <a:solidFill>
-                  <a:srgbClr val="444444"/>
-                </a:solidFill>
-                <a:effectLst/>
-                <a:latin typeface="Arial" panose="020B0604020202020204" pitchFamily="34" charset="0"/>
-              </a:rPr>
-              <a:t>:</a:t>
-            </a:r>
-            <a:r>
-              <a:rPr lang="en-US" b="0" i="0" u="none" strike="noStrike" dirty="0">
+              <a:t>Segunda parte:</a:t>
+            </a:r>
+            <a:r>
+              <a:rPr lang="es-ES_tradnl" b="0" i="0" u="none" strike="noStrike" dirty="0">
                 <a:solidFill>
                   <a:srgbClr val="444444"/>
                 </a:solidFill>
@@ -3659,189 +4092,59 @@
           <a:p>
             <a:pPr algn="l"/>
             <a:r>
-              <a:rPr lang="en-US" b="0" i="0" u="none" strike="noStrike" dirty="0" err="1">
+              <a:rPr lang="es-ES_tradnl" b="0" i="0" u="none" strike="noStrike" dirty="0">
                 <a:solidFill>
                   <a:srgbClr val="444444"/>
                 </a:solidFill>
                 <a:effectLst/>
                 <a:latin typeface="Arial" panose="020B0604020202020204" pitchFamily="34" charset="0"/>
               </a:rPr>
-              <a:t>Hipótesis</a:t>
-            </a:r>
-            <a:r>
-              <a:rPr lang="en-US" b="0" i="0" u="none" strike="noStrike" dirty="0">
+              <a:t>Hipótesis (Preguntas de investigación)  +  Objetivos +  Descripción de los Datos Metodología, </a:t>
+            </a:r>
+            <a:r>
+              <a:rPr lang="es-ES_tradnl" b="0" i="0" u="none" strike="noStrike" dirty="0" err="1">
                 <a:solidFill>
                   <a:srgbClr val="444444"/>
                 </a:solidFill>
                 <a:effectLst/>
                 <a:latin typeface="Arial" panose="020B0604020202020204" pitchFamily="34" charset="0"/>
               </a:rPr>
-              <a:t> (</a:t>
-            </a:r>
-            <a:r>
-              <a:rPr lang="en-US" b="0" i="0" u="none" strike="noStrike" dirty="0" err="1">
+              <a:t>Exploratory</a:t>
+            </a:r>
+            <a:r>
+              <a:rPr lang="es-ES_tradnl" b="0" i="0" u="none" strike="noStrike" dirty="0">
                 <a:solidFill>
                   <a:srgbClr val="444444"/>
                 </a:solidFill>
                 <a:effectLst/>
                 <a:latin typeface="Arial" panose="020B0604020202020204" pitchFamily="34" charset="0"/>
               </a:rPr>
-              <a:t>Preguntas</a:t>
-            </a:r>
-            <a:r>
-              <a:rPr lang="en-US" b="0" i="0" u="none" strike="noStrike" dirty="0">
+              <a:t> Data </a:t>
+            </a:r>
+            <a:r>
+              <a:rPr lang="es-ES_tradnl" b="0" i="0" u="none" strike="noStrike" dirty="0" err="1">
                 <a:solidFill>
                   <a:srgbClr val="444444"/>
                 </a:solidFill>
                 <a:effectLst/>
                 <a:latin typeface="Arial" panose="020B0604020202020204" pitchFamily="34" charset="0"/>
               </a:rPr>
-              <a:t> de </a:t>
-            </a:r>
-            <a:r>
-              <a:rPr lang="en-US" b="0" i="0" u="none" strike="noStrike" dirty="0" err="1">
+              <a:t>Analysis</a:t>
+            </a:r>
+            <a:r>
+              <a:rPr lang="es-ES_tradnl" b="0" i="0" u="none" strike="noStrike" dirty="0">
                 <a:solidFill>
                   <a:srgbClr val="444444"/>
                 </a:solidFill>
                 <a:effectLst/>
                 <a:latin typeface="Arial" panose="020B0604020202020204" pitchFamily="34" charset="0"/>
               </a:rPr>
-              <a:t>investigación</a:t>
-            </a:r>
-            <a:r>
-              <a:rPr lang="en-US" b="0" i="0" u="none" strike="noStrike" dirty="0">
-                <a:solidFill>
-                  <a:srgbClr val="444444"/>
-                </a:solidFill>
-                <a:effectLst/>
-                <a:latin typeface="Arial" panose="020B0604020202020204" pitchFamily="34" charset="0"/>
-              </a:rPr>
-              <a:t>)  +  </a:t>
-            </a:r>
-            <a:r>
-              <a:rPr lang="en-US" b="0" i="0" u="none" strike="noStrike" dirty="0" err="1">
-                <a:solidFill>
-                  <a:srgbClr val="444444"/>
-                </a:solidFill>
-                <a:effectLst/>
-                <a:latin typeface="Arial" panose="020B0604020202020204" pitchFamily="34" charset="0"/>
-              </a:rPr>
-              <a:t>Objetivos</a:t>
-            </a:r>
-            <a:r>
-              <a:rPr lang="en-US" b="0" i="0" u="none" strike="noStrike" dirty="0">
-                <a:solidFill>
-                  <a:srgbClr val="444444"/>
-                </a:solidFill>
-                <a:effectLst/>
-                <a:latin typeface="Arial" panose="020B0604020202020204" pitchFamily="34" charset="0"/>
-              </a:rPr>
-              <a:t> +  </a:t>
-            </a:r>
-            <a:r>
-              <a:rPr lang="en-US" b="0" i="0" u="none" strike="noStrike" dirty="0" err="1">
-                <a:solidFill>
-                  <a:srgbClr val="444444"/>
-                </a:solidFill>
-                <a:effectLst/>
-                <a:latin typeface="Arial" panose="020B0604020202020204" pitchFamily="34" charset="0"/>
-              </a:rPr>
-              <a:t>Descripción</a:t>
-            </a:r>
-            <a:r>
-              <a:rPr lang="en-US" b="0" i="0" u="none" strike="noStrike" dirty="0">
-                <a:solidFill>
-                  <a:srgbClr val="444444"/>
-                </a:solidFill>
-                <a:effectLst/>
-                <a:latin typeface="Arial" panose="020B0604020202020204" pitchFamily="34" charset="0"/>
-              </a:rPr>
-              <a:t> de </a:t>
-            </a:r>
-            <a:r>
-              <a:rPr lang="en-US" b="0" i="0" u="none" strike="noStrike" dirty="0" err="1">
-                <a:solidFill>
-                  <a:srgbClr val="444444"/>
-                </a:solidFill>
-                <a:effectLst/>
-                <a:latin typeface="Arial" panose="020B0604020202020204" pitchFamily="34" charset="0"/>
-              </a:rPr>
-              <a:t>los</a:t>
-            </a:r>
-            <a:r>
-              <a:rPr lang="en-US" b="0" i="0" u="none" strike="noStrike" dirty="0">
-                <a:solidFill>
-                  <a:srgbClr val="444444"/>
-                </a:solidFill>
-                <a:effectLst/>
-                <a:latin typeface="Arial" panose="020B0604020202020204" pitchFamily="34" charset="0"/>
-              </a:rPr>
-              <a:t> Datos </a:t>
-            </a:r>
-            <a:r>
-              <a:rPr lang="en-US" b="0" i="0" u="none" strike="noStrike" dirty="0" err="1">
-                <a:solidFill>
-                  <a:srgbClr val="444444"/>
-                </a:solidFill>
-                <a:effectLst/>
-                <a:latin typeface="Arial" panose="020B0604020202020204" pitchFamily="34" charset="0"/>
-              </a:rPr>
-              <a:t>Metodología</a:t>
-            </a:r>
-            <a:r>
-              <a:rPr lang="en-US" b="0" i="0" u="none" strike="noStrike" dirty="0">
-                <a:solidFill>
-                  <a:srgbClr val="444444"/>
-                </a:solidFill>
-                <a:effectLst/>
-                <a:latin typeface="Arial" panose="020B0604020202020204" pitchFamily="34" charset="0"/>
-              </a:rPr>
-              <a:t>, Exploratory Data Analysis, </a:t>
-            </a:r>
-            <a:r>
-              <a:rPr lang="en-US" b="0" i="0" u="none" strike="noStrike" dirty="0" err="1">
-                <a:solidFill>
-                  <a:srgbClr val="444444"/>
-                </a:solidFill>
-                <a:effectLst/>
-                <a:latin typeface="Arial" panose="020B0604020202020204" pitchFamily="34" charset="0"/>
-              </a:rPr>
-              <a:t>Modelos</a:t>
-            </a:r>
-            <a:r>
-              <a:rPr lang="en-US" b="0" i="0" u="none" strike="noStrike" dirty="0">
-                <a:solidFill>
-                  <a:srgbClr val="444444"/>
-                </a:solidFill>
-                <a:effectLst/>
-                <a:latin typeface="Arial" panose="020B0604020202020204" pitchFamily="34" charset="0"/>
-              </a:rPr>
-              <a:t>       (5 </a:t>
-            </a:r>
-            <a:r>
-              <a:rPr lang="en-US" b="0" i="0" u="none" strike="noStrike" dirty="0" err="1">
-                <a:solidFill>
-                  <a:srgbClr val="444444"/>
-                </a:solidFill>
-                <a:effectLst/>
-                <a:latin typeface="Arial" panose="020B0604020202020204" pitchFamily="34" charset="0"/>
-              </a:rPr>
-              <a:t>minutos</a:t>
-            </a:r>
-            <a:r>
-              <a:rPr lang="en-US" b="0" i="0" u="none" strike="noStrike" dirty="0">
-                <a:solidFill>
-                  <a:srgbClr val="444444"/>
-                </a:solidFill>
-                <a:effectLst/>
-                <a:latin typeface="Arial" panose="020B0604020202020204" pitchFamily="34" charset="0"/>
-              </a:rPr>
-              <a:t>)</a:t>
+              <a:t>, Modelos       (5 minutos)</a:t>
             </a:r>
           </a:p>
           <a:p>
             <a:pPr algn="l"/>
-            <a:endParaRPr lang="en-US" b="0" i="0" u="none" strike="noStrike" dirty="0">
+            <a:endParaRPr lang="es-ES_tradnl" b="0" i="0" u="none" strike="noStrike" dirty="0">
               <a:solidFill>
                 <a:srgbClr val="444444"/>
               </a:solidFill>
@@ -3852,47 +4155,17 @@
           <a:p>
             <a:pPr algn="l"/>
             <a:r>
-              <a:rPr lang="en-US" b="1" i="0" u="none" strike="noStrike" dirty="0" err="1">
+              <a:rPr lang="es-ES_tradnl" b="1" i="0" u="none" strike="noStrike" dirty="0">
                 <a:solidFill>
                   <a:srgbClr val="444444"/>
                 </a:solidFill>
                 <a:effectLst/>
                 <a:latin typeface="Arial" panose="020B0604020202020204" pitchFamily="34" charset="0"/>
               </a:rPr>
-              <a:t>Tercera</a:t>
-            </a:r>
-            <a:r>
-              <a:rPr lang="en-US" b="1" i="0" u="none" strike="noStrike" dirty="0">
-                <a:solidFill>
-                  <a:srgbClr val="444444"/>
-                </a:solidFill>
-                <a:effectLst/>
-                <a:latin typeface="Arial" panose="020B0604020202020204" pitchFamily="34" charset="0"/>
-              </a:rPr>
-              <a:t> </a:t>
-            </a:r>
-            <a:r>
-              <a:rPr lang="en-US" b="1" i="0" u="none" strike="noStrike" dirty="0" err="1">
-                <a:solidFill>
-                  <a:srgbClr val="444444"/>
-                </a:solidFill>
-                <a:effectLst/>
-                <a:latin typeface="Arial" panose="020B0604020202020204" pitchFamily="34" charset="0"/>
-              </a:rPr>
-              <a:t>parte</a:t>
-            </a:r>
-            <a:r>
-              <a:rPr lang="en-US" b="1" i="0" u="none" strike="noStrike" dirty="0">
-                <a:solidFill>
-                  <a:srgbClr val="444444"/>
-                </a:solidFill>
-                <a:effectLst/>
-                <a:latin typeface="Arial" panose="020B0604020202020204" pitchFamily="34" charset="0"/>
-              </a:rPr>
-              <a:t>:</a:t>
-            </a:r>
-            <a:r>
-              <a:rPr lang="en-US" b="0" i="0" u="none" strike="noStrike" dirty="0">
+              <a:t>Tercera parte:</a:t>
+            </a:r>
+            <a:r>
+              <a:rPr lang="es-ES_tradnl" b="0" i="0" u="none" strike="noStrike" dirty="0">
                 <a:solidFill>
                   <a:srgbClr val="444444"/>
                 </a:solidFill>
@@ -3905,70 +4178,20 @@
           <a:p>
             <a:pPr algn="l"/>
             <a:r>
-              <a:rPr lang="en-US" b="0" i="0" u="none" strike="noStrike" dirty="0" err="1">
+              <a:rPr lang="es-ES_tradnl" b="0" i="0" u="none" strike="noStrike" dirty="0">
                 <a:solidFill>
                   <a:srgbClr val="444444"/>
                 </a:solidFill>
                 <a:effectLst/>
                 <a:latin typeface="Arial" panose="020B0604020202020204" pitchFamily="34" charset="0"/>
               </a:rPr>
-              <a:t>Resultados</a:t>
-            </a:r>
-            <a:r>
-              <a:rPr lang="en-US" b="0" i="0" u="none" strike="noStrike" dirty="0">
-                <a:solidFill>
-                  <a:srgbClr val="444444"/>
-                </a:solidFill>
-                <a:effectLst/>
-                <a:latin typeface="Arial" panose="020B0604020202020204" pitchFamily="34" charset="0"/>
-              </a:rPr>
-              <a:t> y </a:t>
-            </a:r>
-            <a:r>
-              <a:rPr lang="en-US" b="0" i="0" u="none" strike="noStrike" dirty="0" err="1">
-                <a:solidFill>
-                  <a:srgbClr val="444444"/>
-                </a:solidFill>
-                <a:effectLst/>
-                <a:latin typeface="Arial" panose="020B0604020202020204" pitchFamily="34" charset="0"/>
-              </a:rPr>
-              <a:t>Alcances</a:t>
-            </a:r>
-            <a:r>
-              <a:rPr lang="en-US" b="0" i="0" u="none" strike="noStrike" dirty="0">
-                <a:solidFill>
-                  <a:srgbClr val="444444"/>
-                </a:solidFill>
-                <a:effectLst/>
-                <a:latin typeface="Arial" panose="020B0604020202020204" pitchFamily="34" charset="0"/>
-              </a:rPr>
-              <a:t>    (8 </a:t>
-            </a:r>
-            <a:r>
-              <a:rPr lang="en-US" b="0" i="0" u="none" strike="noStrike" dirty="0" err="1">
-                <a:solidFill>
-                  <a:srgbClr val="444444"/>
-                </a:solidFill>
-                <a:effectLst/>
-                <a:latin typeface="Arial" panose="020B0604020202020204" pitchFamily="34" charset="0"/>
-              </a:rPr>
-              <a:t>minutos</a:t>
-            </a:r>
-            <a:r>
-              <a:rPr lang="en-US" b="0" i="0" u="none" strike="noStrike" dirty="0">
-                <a:solidFill>
-                  <a:srgbClr val="444444"/>
-                </a:solidFill>
-                <a:effectLst/>
-                <a:latin typeface="Arial" panose="020B0604020202020204" pitchFamily="34" charset="0"/>
-              </a:rPr>
-              <a:t>)                                                  </a:t>
+              <a:t>Resultados y Alcances    (8 minutos)                                                  </a:t>
             </a:r>
           </a:p>
           <a:p>
             <a:pPr algn="l"/>
             <a:r>
-              <a:rPr lang="en-US" b="0" i="0" u="none" strike="noStrike" dirty="0">
+              <a:rPr lang="es-ES_tradnl" b="0" i="0" u="none" strike="noStrike" dirty="0">
                 <a:solidFill>
                   <a:srgbClr val="444444"/>
                 </a:solidFill>
@@ -3981,47 +4204,17 @@
           <a:p>
             <a:pPr algn="l"/>
             <a:r>
-              <a:rPr lang="en-US" b="1" i="0" u="none" strike="noStrike" dirty="0" err="1">
+              <a:rPr lang="es-ES_tradnl" b="1" i="0" u="none" strike="noStrike" dirty="0">
                 <a:solidFill>
                   <a:srgbClr val="444444"/>
                 </a:solidFill>
                 <a:effectLst/>
                 <a:latin typeface="Arial" panose="020B0604020202020204" pitchFamily="34" charset="0"/>
               </a:rPr>
-              <a:t>Cuarta</a:t>
-            </a:r>
-            <a:r>
-              <a:rPr lang="en-US" b="1" i="0" u="none" strike="noStrike" dirty="0">
-                <a:solidFill>
-                  <a:srgbClr val="444444"/>
-                </a:solidFill>
-                <a:effectLst/>
-                <a:latin typeface="Arial" panose="020B0604020202020204" pitchFamily="34" charset="0"/>
-              </a:rPr>
-              <a:t> </a:t>
-            </a:r>
-            <a:r>
-              <a:rPr lang="en-US" b="1" i="0" u="none" strike="noStrike" dirty="0" err="1">
-                <a:solidFill>
-                  <a:srgbClr val="444444"/>
-                </a:solidFill>
-                <a:effectLst/>
-                <a:latin typeface="Arial" panose="020B0604020202020204" pitchFamily="34" charset="0"/>
-              </a:rPr>
-              <a:t>parte</a:t>
-            </a:r>
-            <a:r>
-              <a:rPr lang="en-US" b="1" i="0" u="none" strike="noStrike" dirty="0">
-                <a:solidFill>
-                  <a:srgbClr val="444444"/>
-                </a:solidFill>
-                <a:effectLst/>
-                <a:latin typeface="Arial" panose="020B0604020202020204" pitchFamily="34" charset="0"/>
-              </a:rPr>
-              <a:t>:</a:t>
-            </a:r>
-            <a:r>
-              <a:rPr lang="en-US" b="0" i="0" u="none" strike="noStrike" dirty="0">
+              <a:t>Cuarta parte:</a:t>
+            </a:r>
+            <a:r>
+              <a:rPr lang="es-ES_tradnl" b="0" i="0" u="none" strike="noStrike" dirty="0">
                 <a:solidFill>
                   <a:srgbClr val="444444"/>
                 </a:solidFill>
@@ -4034,110 +4227,20 @@
           <a:p>
             <a:pPr algn="l"/>
             <a:r>
-              <a:rPr lang="en-US" b="0" i="0" u="none" strike="noStrike" dirty="0" err="1">
+              <a:rPr lang="es-ES_tradnl" b="0" i="0" u="none" strike="noStrike" dirty="0">
                 <a:solidFill>
                   <a:srgbClr val="444444"/>
                 </a:solidFill>
                 <a:effectLst/>
                 <a:latin typeface="Arial" panose="020B0604020202020204" pitchFamily="34" charset="0"/>
               </a:rPr>
-              <a:t>Conclusiones</a:t>
-            </a:r>
-            <a:r>
-              <a:rPr lang="en-US" b="0" i="0" u="none" strike="noStrike" dirty="0">
-                <a:solidFill>
-                  <a:srgbClr val="444444"/>
-                </a:solidFill>
-                <a:effectLst/>
-                <a:latin typeface="Arial" panose="020B0604020202020204" pitchFamily="34" charset="0"/>
-              </a:rPr>
-              <a:t> + </a:t>
-            </a:r>
-            <a:r>
-              <a:rPr lang="en-US" b="0" i="0" u="none" strike="noStrike" dirty="0" err="1">
-                <a:solidFill>
-                  <a:srgbClr val="444444"/>
-                </a:solidFill>
-                <a:effectLst/>
-                <a:latin typeface="Arial" panose="020B0604020202020204" pitchFamily="34" charset="0"/>
-              </a:rPr>
-              <a:t>Discusión</a:t>
-            </a:r>
-            <a:r>
-              <a:rPr lang="en-US" b="0" i="0" u="none" strike="noStrike" dirty="0">
-                <a:solidFill>
-                  <a:srgbClr val="444444"/>
-                </a:solidFill>
-                <a:effectLst/>
-                <a:latin typeface="Arial" panose="020B0604020202020204" pitchFamily="34" charset="0"/>
-              </a:rPr>
-              <a:t> + </a:t>
-            </a:r>
-            <a:r>
-              <a:rPr lang="en-US" b="0" i="0" u="none" strike="noStrike" dirty="0" err="1">
-                <a:solidFill>
-                  <a:srgbClr val="444444"/>
-                </a:solidFill>
-                <a:effectLst/>
-                <a:latin typeface="Arial" panose="020B0604020202020204" pitchFamily="34" charset="0"/>
-              </a:rPr>
-              <a:t>Limitaciones</a:t>
-            </a:r>
-            <a:r>
-              <a:rPr lang="en-US" b="0" i="0" u="none" strike="noStrike" dirty="0">
-                <a:solidFill>
-                  <a:srgbClr val="444444"/>
-                </a:solidFill>
-                <a:effectLst/>
-                <a:latin typeface="Arial" panose="020B0604020202020204" pitchFamily="34" charset="0"/>
-              </a:rPr>
-              <a:t>  + </a:t>
-            </a:r>
-            <a:r>
-              <a:rPr lang="en-US" b="0" i="0" u="none" strike="noStrike" dirty="0" err="1">
-                <a:solidFill>
-                  <a:srgbClr val="444444"/>
-                </a:solidFill>
-                <a:effectLst/>
-                <a:latin typeface="Arial" panose="020B0604020202020204" pitchFamily="34" charset="0"/>
-              </a:rPr>
-              <a:t>Trabajo</a:t>
-            </a:r>
-            <a:r>
-              <a:rPr lang="en-US" b="0" i="0" u="none" strike="noStrike" dirty="0">
-                <a:solidFill>
-                  <a:srgbClr val="444444"/>
-                </a:solidFill>
-                <a:effectLst/>
-                <a:latin typeface="Arial" panose="020B0604020202020204" pitchFamily="34" charset="0"/>
-              </a:rPr>
-              <a:t> Futuro  (3 </a:t>
-            </a:r>
-            <a:r>
-              <a:rPr lang="en-US" b="0" i="0" u="none" strike="noStrike" dirty="0" err="1">
-                <a:solidFill>
-                  <a:srgbClr val="444444"/>
-                </a:solidFill>
-                <a:effectLst/>
-                <a:latin typeface="Arial" panose="020B0604020202020204" pitchFamily="34" charset="0"/>
-              </a:rPr>
-              <a:t>minutos</a:t>
-            </a:r>
-            <a:r>
-              <a:rPr lang="en-US" b="0" i="0" u="none" strike="noStrike" dirty="0">
-                <a:solidFill>
-                  <a:srgbClr val="444444"/>
-                </a:solidFill>
-                <a:effectLst/>
-                <a:latin typeface="Arial" panose="020B0604020202020204" pitchFamily="34" charset="0"/>
-              </a:rPr>
-              <a:t>)                                 </a:t>
+              <a:t>Conclusiones + Discusión + Limitaciones  + Trabajo Futuro  (3 minutos)                                 </a:t>
             </a:r>
           </a:p>
           <a:p>
             <a:pPr algn="l"/>
             <a:r>
-              <a:rPr lang="en-US" b="0" i="0" u="none" strike="noStrike" dirty="0">
+              <a:rPr lang="es-ES_tradnl" b="0" i="0" u="none" strike="noStrike" dirty="0">
                 <a:solidFill>
                   <a:srgbClr val="444444"/>
                 </a:solidFill>
@@ -4149,7 +4252,7 @@
           </a:p>
           <a:p>
             <a:pPr algn="l"/>
-            <a:endParaRPr lang="en-CL" dirty="0"/>
+            <a:endParaRPr lang="es-ES_tradnl" dirty="0"/>
           </a:p>
         </p:txBody>
       </p:sp>
@@ -4157,6 +4260,2454 @@
     <p:extLst>
       <p:ext uri="{BB962C8B-B14F-4D97-AF65-F5344CB8AC3E}">
         <p14:creationId xmlns:p14="http://schemas.microsoft.com/office/powerpoint/2010/main" val="4286873895"/>
+      </p:ext>
+    </p:extLst>
+  </p:cSld>
+  <p:clrMapOvr>
+    <a:masterClrMapping/>
+  </p:clrMapOvr>
+</p:sld>
+</file>
+
+<file path=ppt/slides/slide2.xml><?xml version="1.0" encoding="utf-8"?>
+<p:sld xmlns:a="http://schemas.openxmlformats.org/drawingml/2006/main" xmlns:r="http://schemas.openxmlformats.org/officeDocument/2006/relationships" xmlns:p="http://schemas.openxmlformats.org/presentationml/2006/main">
+  <p:cSld>
+    <p:spTree>
+      <p:nvGrpSpPr>
+        <p:cNvPr id="1" name="">
+          <a:extLst>
+            <a:ext uri="{FF2B5EF4-FFF2-40B4-BE49-F238E27FC236}">
+              <a16:creationId xmlns:a16="http://schemas.microsoft.com/office/drawing/2014/main" id="{9D33F614-438C-44F7-5772-63C9966919DE}"/>
+            </a:ext>
+          </a:extLst>
+        </p:cNvPr>
+        <p:cNvGrpSpPr/>
+        <p:nvPr/>
+      </p:nvGrpSpPr>
+      <p:grpSpPr>
+        <a:xfrm>
+          <a:off x="0" y="0"/>
+          <a:ext cx="0" cy="0"/>
+          <a:chOff x="0" y="0"/>
+          <a:chExt cx="0" cy="0"/>
+        </a:xfrm>
+      </p:grpSpPr>
+      <p:sp>
+        <p:nvSpPr>
+          <p:cNvPr id="2" name="Title 1">
+            <a:extLst>
+              <a:ext uri="{FF2B5EF4-FFF2-40B4-BE49-F238E27FC236}">
+                <a16:creationId xmlns:a16="http://schemas.microsoft.com/office/drawing/2014/main" id="{87F24AA5-DA9A-BDE6-1AD8-0775C552BF05}"/>
+              </a:ext>
+            </a:extLst>
+          </p:cNvPr>
+          <p:cNvSpPr>
+            <a:spLocks noGrp="1"/>
+          </p:cNvSpPr>
+          <p:nvPr>
+            <p:ph type="ctrTitle"/>
+          </p:nvPr>
+        </p:nvSpPr>
+        <p:spPr>
+          <a:xfrm>
+            <a:off x="1431403" y="416307"/>
+            <a:ext cx="9144000" cy="868483"/>
+          </a:xfrm>
+        </p:spPr>
+        <p:txBody>
+          <a:bodyPr>
+            <a:normAutofit fontScale="90000"/>
+          </a:bodyPr>
+          <a:lstStyle/>
+          <a:p>
+            <a:r>
+              <a:rPr lang="en-CL"/>
+              <a:t>AGENDA CASPTONE</a:t>
+            </a:r>
+          </a:p>
+        </p:txBody>
+      </p:sp>
+      <p:sp>
+        <p:nvSpPr>
+          <p:cNvPr id="3" name="Subtitle 2">
+            <a:extLst>
+              <a:ext uri="{FF2B5EF4-FFF2-40B4-BE49-F238E27FC236}">
+                <a16:creationId xmlns:a16="http://schemas.microsoft.com/office/drawing/2014/main" id="{D8187BCC-52D1-C2AC-5459-862665C47DE2}"/>
+              </a:ext>
+            </a:extLst>
+          </p:cNvPr>
+          <p:cNvSpPr>
+            <a:spLocks noGrp="1"/>
+          </p:cNvSpPr>
+          <p:nvPr>
+            <p:ph type="subTitle" idx="1"/>
+          </p:nvPr>
+        </p:nvSpPr>
+        <p:spPr>
+          <a:xfrm>
+            <a:off x="1524000" y="1562582"/>
+            <a:ext cx="9144000" cy="4409955"/>
+          </a:xfrm>
+        </p:spPr>
+        <p:txBody>
+          <a:bodyPr>
+            <a:normAutofit/>
+          </a:bodyPr>
+          <a:lstStyle/>
+          <a:p>
+            <a:pPr algn="l"/>
+            <a:r>
+              <a:rPr lang="es-ES_tradnl" b="1" i="0" u="none" strike="noStrike" dirty="0">
+                <a:solidFill>
+                  <a:srgbClr val="444444"/>
+                </a:solidFill>
+                <a:effectLst/>
+                <a:latin typeface="Arial" panose="020B0604020202020204" pitchFamily="34" charset="0"/>
+              </a:rPr>
+              <a:t>Primera parte/ Descripción del Problema:</a:t>
+            </a:r>
+            <a:r>
+              <a:rPr lang="es-ES_tradnl" b="0" i="0" u="none" strike="noStrike" dirty="0">
+                <a:solidFill>
+                  <a:srgbClr val="444444"/>
+                </a:solidFill>
+                <a:effectLst/>
+                <a:latin typeface="Arial" panose="020B0604020202020204" pitchFamily="34" charset="0"/>
+              </a:rPr>
+              <a:t> </a:t>
+            </a:r>
+          </a:p>
+          <a:p>
+            <a:pPr algn="l"/>
+            <a:r>
+              <a:rPr lang="es-ES_tradnl" b="0" i="0" u="none" strike="noStrike" dirty="0">
+                <a:solidFill>
+                  <a:srgbClr val="444444"/>
+                </a:solidFill>
+                <a:effectLst/>
+                <a:latin typeface="Arial" panose="020B0604020202020204" pitchFamily="34" charset="0"/>
+              </a:rPr>
+              <a:t>Estado del arte + Planteamiento del Problema (4 minutos):</a:t>
+            </a:r>
+          </a:p>
+          <a:p>
+            <a:pPr algn="l"/>
+            <a:endParaRPr lang="es-ES_tradnl" b="0" i="0" u="none" strike="noStrike" dirty="0">
+              <a:solidFill>
+                <a:srgbClr val="444444"/>
+              </a:solidFill>
+              <a:effectLst/>
+              <a:latin typeface="Arial" panose="020B0604020202020204" pitchFamily="34" charset="0"/>
+            </a:endParaRPr>
+          </a:p>
+          <a:p>
+            <a:pPr algn="l"/>
+            <a:r>
+              <a:rPr lang="es-ES_tradnl" b="0" i="0" u="none" strike="noStrike" dirty="0">
+                <a:solidFill>
+                  <a:srgbClr val="444444"/>
+                </a:solidFill>
+                <a:effectLst/>
+                <a:latin typeface="Arial" panose="020B0604020202020204" pitchFamily="34" charset="0"/>
+              </a:rPr>
+              <a:t>Identificar patrones</a:t>
+            </a:r>
+            <a:r>
+              <a:rPr lang="es-ES_tradnl" dirty="0">
+                <a:solidFill>
+                  <a:srgbClr val="444444"/>
+                </a:solidFill>
+                <a:latin typeface="Arial" panose="020B0604020202020204" pitchFamily="34" charset="0"/>
+              </a:rPr>
+              <a:t> comunes entre países tomando como base los </a:t>
+            </a:r>
+            <a:r>
+              <a:rPr lang="es-ES_tradnl" u="sng" dirty="0">
+                <a:solidFill>
+                  <a:srgbClr val="444444"/>
+                </a:solidFill>
+                <a:latin typeface="Arial" panose="020B0604020202020204" pitchFamily="34" charset="0"/>
+              </a:rPr>
+              <a:t>programas de gobierno</a:t>
+            </a:r>
+            <a:r>
+              <a:rPr lang="es-ES_tradnl" dirty="0">
+                <a:solidFill>
+                  <a:srgbClr val="444444"/>
+                </a:solidFill>
+                <a:latin typeface="Arial" panose="020B0604020202020204" pitchFamily="34" charset="0"/>
+              </a:rPr>
+              <a:t> de candidatos a la presidencia, que permita clasificarlos frente a la problemática común de la Corrupción.</a:t>
+            </a:r>
+          </a:p>
+          <a:p>
+            <a:pPr algn="l"/>
+            <a:endParaRPr lang="es-ES_tradnl" dirty="0"/>
+          </a:p>
+        </p:txBody>
+      </p:sp>
+    </p:spTree>
+    <p:extLst>
+      <p:ext uri="{BB962C8B-B14F-4D97-AF65-F5344CB8AC3E}">
+        <p14:creationId xmlns:p14="http://schemas.microsoft.com/office/powerpoint/2010/main" val="2521100756"/>
+      </p:ext>
+    </p:extLst>
+  </p:cSld>
+  <p:clrMapOvr>
+    <a:masterClrMapping/>
+  </p:clrMapOvr>
+</p:sld>
+</file>
+
+<file path=ppt/slides/slide3.xml><?xml version="1.0" encoding="utf-8"?>
+<p:sld xmlns:a="http://schemas.openxmlformats.org/drawingml/2006/main" xmlns:r="http://schemas.openxmlformats.org/officeDocument/2006/relationships" xmlns:p="http://schemas.openxmlformats.org/presentationml/2006/main">
+  <p:cSld>
+    <p:spTree>
+      <p:nvGrpSpPr>
+        <p:cNvPr id="1" name=""/>
+        <p:cNvGrpSpPr/>
+        <p:nvPr/>
+      </p:nvGrpSpPr>
+      <p:grpSpPr>
+        <a:xfrm>
+          <a:off x="0" y="0"/>
+          <a:ext cx="0" cy="0"/>
+          <a:chOff x="0" y="0"/>
+          <a:chExt cx="0" cy="0"/>
+        </a:xfrm>
+      </p:grpSpPr>
+      <p:sp>
+        <p:nvSpPr>
+          <p:cNvPr id="2" name="Title 1">
+            <a:extLst>
+              <a:ext uri="{FF2B5EF4-FFF2-40B4-BE49-F238E27FC236}">
+                <a16:creationId xmlns:a16="http://schemas.microsoft.com/office/drawing/2014/main" id="{B0C10C87-8B95-7992-0DD1-02078DF16201}"/>
+              </a:ext>
+            </a:extLst>
+          </p:cNvPr>
+          <p:cNvSpPr>
+            <a:spLocks noGrp="1"/>
+          </p:cNvSpPr>
+          <p:nvPr>
+            <p:ph type="title"/>
+          </p:nvPr>
+        </p:nvSpPr>
+        <p:spPr>
+          <a:xfrm>
+            <a:off x="1039368" y="538861"/>
+            <a:ext cx="10515600" cy="677291"/>
+          </a:xfrm>
+        </p:spPr>
+        <p:txBody>
+          <a:bodyPr>
+            <a:normAutofit/>
+          </a:bodyPr>
+          <a:lstStyle/>
+          <a:p>
+            <a:r>
+              <a:rPr lang="es-ES_tradnl" sz="3200" dirty="0"/>
+              <a:t>1. Descripción del problema</a:t>
+            </a:r>
+          </a:p>
+        </p:txBody>
+      </p:sp>
+      <p:sp>
+        <p:nvSpPr>
+          <p:cNvPr id="3" name="Content Placeholder 2">
+            <a:extLst>
+              <a:ext uri="{FF2B5EF4-FFF2-40B4-BE49-F238E27FC236}">
+                <a16:creationId xmlns:a16="http://schemas.microsoft.com/office/drawing/2014/main" id="{99ED0F22-AC59-8D7C-D6A3-C0F421EFE946}"/>
+              </a:ext>
+            </a:extLst>
+          </p:cNvPr>
+          <p:cNvSpPr>
+            <a:spLocks noGrp="1"/>
+          </p:cNvSpPr>
+          <p:nvPr>
+            <p:ph idx="1"/>
+          </p:nvPr>
+        </p:nvSpPr>
+        <p:spPr>
+          <a:xfrm>
+            <a:off x="838200" y="1444752"/>
+            <a:ext cx="10515600" cy="4960811"/>
+          </a:xfrm>
+        </p:spPr>
+        <p:txBody>
+          <a:bodyPr>
+            <a:normAutofit/>
+          </a:bodyPr>
+          <a:lstStyle/>
+          <a:p>
+            <a:r>
+              <a:rPr lang="es-ES_tradnl" sz="2400" dirty="0"/>
+              <a:t>En una elección presidencial, los programas de gobierno son meras declaraciones de intenciones de los candidatos. </a:t>
+            </a:r>
+          </a:p>
+          <a:p>
+            <a:r>
+              <a:rPr lang="es-ES_tradnl" sz="2400" dirty="0"/>
+              <a:t>Una vez que un candidato triunfa en una elección, la implementación del programa enfrenta diversos factores, como la realidad económica y política del país, y la necesidad de negociación legislativa.</a:t>
+            </a:r>
+          </a:p>
+        </p:txBody>
+      </p:sp>
+    </p:spTree>
+    <p:extLst>
+      <p:ext uri="{BB962C8B-B14F-4D97-AF65-F5344CB8AC3E}">
+        <p14:creationId xmlns:p14="http://schemas.microsoft.com/office/powerpoint/2010/main" val="4098449019"/>
+      </p:ext>
+    </p:extLst>
+  </p:cSld>
+  <p:clrMapOvr>
+    <a:masterClrMapping/>
+  </p:clrMapOvr>
+</p:sld>
+</file>
+
+<file path=ppt/slides/slide4.xml><?xml version="1.0" encoding="utf-8"?>
+<p:sld xmlns:a="http://schemas.openxmlformats.org/drawingml/2006/main" xmlns:r="http://schemas.openxmlformats.org/officeDocument/2006/relationships" xmlns:p="http://schemas.openxmlformats.org/presentationml/2006/main">
+  <p:cSld>
+    <p:spTree>
+      <p:nvGrpSpPr>
+        <p:cNvPr id="1" name="">
+          <a:extLst>
+            <a:ext uri="{FF2B5EF4-FFF2-40B4-BE49-F238E27FC236}">
+              <a16:creationId xmlns:a16="http://schemas.microsoft.com/office/drawing/2014/main" id="{1B2ED24C-30DF-CFC7-A990-FD42568FAADF}"/>
+            </a:ext>
+          </a:extLst>
+        </p:cNvPr>
+        <p:cNvGrpSpPr/>
+        <p:nvPr/>
+      </p:nvGrpSpPr>
+      <p:grpSpPr>
+        <a:xfrm>
+          <a:off x="0" y="0"/>
+          <a:ext cx="0" cy="0"/>
+          <a:chOff x="0" y="0"/>
+          <a:chExt cx="0" cy="0"/>
+        </a:xfrm>
+      </p:grpSpPr>
+      <p:sp>
+        <p:nvSpPr>
+          <p:cNvPr id="2" name="Title 1">
+            <a:extLst>
+              <a:ext uri="{FF2B5EF4-FFF2-40B4-BE49-F238E27FC236}">
+                <a16:creationId xmlns:a16="http://schemas.microsoft.com/office/drawing/2014/main" id="{38CACE36-CD48-98FA-CFEB-3A31D641605B}"/>
+              </a:ext>
+            </a:extLst>
+          </p:cNvPr>
+          <p:cNvSpPr>
+            <a:spLocks noGrp="1"/>
+          </p:cNvSpPr>
+          <p:nvPr>
+            <p:ph type="title"/>
+          </p:nvPr>
+        </p:nvSpPr>
+        <p:spPr>
+          <a:xfrm>
+            <a:off x="838200" y="200215"/>
+            <a:ext cx="10515600" cy="677291"/>
+          </a:xfrm>
+        </p:spPr>
+        <p:txBody>
+          <a:bodyPr>
+            <a:normAutofit/>
+          </a:bodyPr>
+          <a:lstStyle/>
+          <a:p>
+            <a:r>
+              <a:rPr lang="es-ES_tradnl" sz="3200" dirty="0"/>
+              <a:t>2.1 Hipótesis y Objetivos</a:t>
+            </a:r>
+          </a:p>
+        </p:txBody>
+      </p:sp>
+      <p:sp>
+        <p:nvSpPr>
+          <p:cNvPr id="3" name="Content Placeholder 2">
+            <a:extLst>
+              <a:ext uri="{FF2B5EF4-FFF2-40B4-BE49-F238E27FC236}">
+                <a16:creationId xmlns:a16="http://schemas.microsoft.com/office/drawing/2014/main" id="{8F82240C-5B25-16D3-6A08-96A33467B09E}"/>
+              </a:ext>
+            </a:extLst>
+          </p:cNvPr>
+          <p:cNvSpPr>
+            <a:spLocks noGrp="1"/>
+          </p:cNvSpPr>
+          <p:nvPr>
+            <p:ph idx="1"/>
+          </p:nvPr>
+        </p:nvSpPr>
+        <p:spPr>
+          <a:xfrm>
+            <a:off x="838200" y="1444753"/>
+            <a:ext cx="2755392" cy="3630168"/>
+          </a:xfrm>
+        </p:spPr>
+        <p:txBody>
+          <a:bodyPr>
+            <a:normAutofit/>
+          </a:bodyPr>
+          <a:lstStyle/>
+          <a:p>
+            <a:r>
+              <a:rPr lang="es-ES_tradnl" sz="1800" dirty="0"/>
+              <a:t>Hipótesis</a:t>
+            </a:r>
+          </a:p>
+          <a:p>
+            <a:pPr marL="0" indent="0">
+              <a:buNone/>
+            </a:pPr>
+            <a:r>
+              <a:rPr lang="es-ES_tradnl" sz="1800" dirty="0"/>
+              <a:t>“Los programas de gobierno reflejan patrones comunes que permiten agrupar países en comunidades según sus prioridades temáticas, mostrando diferencias consistentes entre comunidades en términos de énfasis político”</a:t>
+            </a:r>
+          </a:p>
+        </p:txBody>
+      </p:sp>
+      <p:sp>
+        <p:nvSpPr>
+          <p:cNvPr id="4" name="Content Placeholder 2">
+            <a:extLst>
+              <a:ext uri="{FF2B5EF4-FFF2-40B4-BE49-F238E27FC236}">
+                <a16:creationId xmlns:a16="http://schemas.microsoft.com/office/drawing/2014/main" id="{888B6FA1-4082-95A5-0742-14D6667BE641}"/>
+              </a:ext>
+            </a:extLst>
+          </p:cNvPr>
+          <p:cNvSpPr txBox="1">
+            <a:spLocks/>
+          </p:cNvSpPr>
+          <p:nvPr/>
+        </p:nvSpPr>
+        <p:spPr>
+          <a:xfrm>
+            <a:off x="3432048" y="1444753"/>
+            <a:ext cx="2755392" cy="3630168"/>
+          </a:xfrm>
+          <a:prstGeom prst="rect">
+            <a:avLst/>
+          </a:prstGeom>
+        </p:spPr>
+        <p:txBody>
+          <a:bodyPr vert="horz" lIns="91440" tIns="45720" rIns="91440" bIns="45720" rtlCol="0">
+            <a:normAutofit/>
+          </a:bodyPr>
+          <a:lstStyle>
+            <a:lvl1pPr marL="228600" indent="-228600" algn="l" defTabSz="914400" rtl="0" eaLnBrk="1" latinLnBrk="0" hangingPunct="1">
+              <a:lnSpc>
+                <a:spcPct val="90000"/>
+              </a:lnSpc>
+              <a:spcBef>
+                <a:spcPts val="1000"/>
+              </a:spcBef>
+              <a:buFont typeface="Arial" panose="020B0604020202020204" pitchFamily="34" charset="0"/>
+              <a:buChar char="•"/>
+              <a:defRPr sz="2800" kern="1200">
+                <a:solidFill>
+                  <a:schemeClr val="tx1"/>
+                </a:solidFill>
+                <a:latin typeface="+mn-lt"/>
+                <a:ea typeface="+mn-ea"/>
+                <a:cs typeface="+mn-cs"/>
+              </a:defRPr>
+            </a:lvl1pPr>
+            <a:lvl2pPr marL="685800" indent="-228600" algn="l" defTabSz="914400" rtl="0" eaLnBrk="1" latinLnBrk="0" hangingPunct="1">
+              <a:lnSpc>
+                <a:spcPct val="90000"/>
+              </a:lnSpc>
+              <a:spcBef>
+                <a:spcPts val="500"/>
+              </a:spcBef>
+              <a:buFont typeface="Arial" panose="020B0604020202020204" pitchFamily="34" charset="0"/>
+              <a:buChar char="•"/>
+              <a:defRPr sz="2400" kern="1200">
+                <a:solidFill>
+                  <a:schemeClr val="tx1"/>
+                </a:solidFill>
+                <a:latin typeface="+mn-lt"/>
+                <a:ea typeface="+mn-ea"/>
+                <a:cs typeface="+mn-cs"/>
+              </a:defRPr>
+            </a:lvl2pPr>
+            <a:lvl3pPr marL="1143000" indent="-228600" algn="l" defTabSz="914400" rtl="0" eaLnBrk="1" latinLnBrk="0" hangingPunct="1">
+              <a:lnSpc>
+                <a:spcPct val="90000"/>
+              </a:lnSpc>
+              <a:spcBef>
+                <a:spcPts val="500"/>
+              </a:spcBef>
+              <a:buFont typeface="Arial" panose="020B0604020202020204" pitchFamily="34" charset="0"/>
+              <a:buChar char="•"/>
+              <a:defRPr sz="2000" kern="1200">
+                <a:solidFill>
+                  <a:schemeClr val="tx1"/>
+                </a:solidFill>
+                <a:latin typeface="+mn-lt"/>
+                <a:ea typeface="+mn-ea"/>
+                <a:cs typeface="+mn-cs"/>
+              </a:defRPr>
+            </a:lvl3pPr>
+            <a:lvl4pPr marL="1600200" indent="-228600" algn="l" defTabSz="914400" rtl="0" eaLnBrk="1" latinLnBrk="0" hangingPunct="1">
+              <a:lnSpc>
+                <a:spcPct val="90000"/>
+              </a:lnSpc>
+              <a:spcBef>
+                <a:spcPts val="500"/>
+              </a:spcBef>
+              <a:buFont typeface="Arial" panose="020B0604020202020204" pitchFamily="34" charset="0"/>
+              <a:buChar char="•"/>
+              <a:defRPr sz="1800" kern="1200">
+                <a:solidFill>
+                  <a:schemeClr val="tx1"/>
+                </a:solidFill>
+                <a:latin typeface="+mn-lt"/>
+                <a:ea typeface="+mn-ea"/>
+                <a:cs typeface="+mn-cs"/>
+              </a:defRPr>
+            </a:lvl4pPr>
+            <a:lvl5pPr marL="2057400" indent="-228600" algn="l" defTabSz="914400" rtl="0" eaLnBrk="1" latinLnBrk="0" hangingPunct="1">
+              <a:lnSpc>
+                <a:spcPct val="90000"/>
+              </a:lnSpc>
+              <a:spcBef>
+                <a:spcPts val="500"/>
+              </a:spcBef>
+              <a:buFont typeface="Arial" panose="020B0604020202020204" pitchFamily="34" charset="0"/>
+              <a:buChar char="•"/>
+              <a:defRPr sz="1800" kern="1200">
+                <a:solidFill>
+                  <a:schemeClr val="tx1"/>
+                </a:solidFill>
+                <a:latin typeface="+mn-lt"/>
+                <a:ea typeface="+mn-ea"/>
+                <a:cs typeface="+mn-cs"/>
+              </a:defRPr>
+            </a:lvl5pPr>
+            <a:lvl6pPr marL="2514600" indent="-228600" algn="l" defTabSz="914400" rtl="0" eaLnBrk="1" latinLnBrk="0" hangingPunct="1">
+              <a:lnSpc>
+                <a:spcPct val="90000"/>
+              </a:lnSpc>
+              <a:spcBef>
+                <a:spcPts val="500"/>
+              </a:spcBef>
+              <a:buFont typeface="Arial" panose="020B0604020202020204" pitchFamily="34" charset="0"/>
+              <a:buChar char="•"/>
+              <a:defRPr sz="1800" kern="1200">
+                <a:solidFill>
+                  <a:schemeClr val="tx1"/>
+                </a:solidFill>
+                <a:latin typeface="+mn-lt"/>
+                <a:ea typeface="+mn-ea"/>
+                <a:cs typeface="+mn-cs"/>
+              </a:defRPr>
+            </a:lvl6pPr>
+            <a:lvl7pPr marL="2971800" indent="-228600" algn="l" defTabSz="914400" rtl="0" eaLnBrk="1" latinLnBrk="0" hangingPunct="1">
+              <a:lnSpc>
+                <a:spcPct val="90000"/>
+              </a:lnSpc>
+              <a:spcBef>
+                <a:spcPts val="500"/>
+              </a:spcBef>
+              <a:buFont typeface="Arial" panose="020B0604020202020204" pitchFamily="34" charset="0"/>
+              <a:buChar char="•"/>
+              <a:defRPr sz="1800" kern="1200">
+                <a:solidFill>
+                  <a:schemeClr val="tx1"/>
+                </a:solidFill>
+                <a:latin typeface="+mn-lt"/>
+                <a:ea typeface="+mn-ea"/>
+                <a:cs typeface="+mn-cs"/>
+              </a:defRPr>
+            </a:lvl7pPr>
+            <a:lvl8pPr marL="3429000" indent="-228600" algn="l" defTabSz="914400" rtl="0" eaLnBrk="1" latinLnBrk="0" hangingPunct="1">
+              <a:lnSpc>
+                <a:spcPct val="90000"/>
+              </a:lnSpc>
+              <a:spcBef>
+                <a:spcPts val="500"/>
+              </a:spcBef>
+              <a:buFont typeface="Arial" panose="020B0604020202020204" pitchFamily="34" charset="0"/>
+              <a:buChar char="•"/>
+              <a:defRPr sz="1800" kern="1200">
+                <a:solidFill>
+                  <a:schemeClr val="tx1"/>
+                </a:solidFill>
+                <a:latin typeface="+mn-lt"/>
+                <a:ea typeface="+mn-ea"/>
+                <a:cs typeface="+mn-cs"/>
+              </a:defRPr>
+            </a:lvl8pPr>
+            <a:lvl9pPr marL="3886200" indent="-228600" algn="l" defTabSz="914400" rtl="0" eaLnBrk="1" latinLnBrk="0" hangingPunct="1">
+              <a:lnSpc>
+                <a:spcPct val="90000"/>
+              </a:lnSpc>
+              <a:spcBef>
+                <a:spcPts val="500"/>
+              </a:spcBef>
+              <a:buFont typeface="Arial" panose="020B0604020202020204" pitchFamily="34" charset="0"/>
+              <a:buChar char="•"/>
+              <a:defRPr sz="1800" kern="1200">
+                <a:solidFill>
+                  <a:schemeClr val="tx1"/>
+                </a:solidFill>
+                <a:latin typeface="+mn-lt"/>
+                <a:ea typeface="+mn-ea"/>
+                <a:cs typeface="+mn-cs"/>
+              </a:defRPr>
+            </a:lvl9pPr>
+          </a:lstStyle>
+          <a:p>
+            <a:r>
+              <a:rPr lang="es-ES_tradnl" sz="1800" dirty="0"/>
+              <a:t>Objetivo general</a:t>
+            </a:r>
+          </a:p>
+          <a:p>
+            <a:pPr marL="0" indent="0">
+              <a:buFont typeface="Arial" panose="020B0604020202020204" pitchFamily="34" charset="0"/>
+              <a:buNone/>
+            </a:pPr>
+            <a:r>
+              <a:rPr lang="es-ES_tradnl" sz="1800" dirty="0"/>
+              <a:t>“Identificar patrones comunes en los programas de gobierno relacionados con la corrupción que permitan agrupar países en comunidades, analizando las diferencias y similitudes temáticas entre las comunidades a lo largo del tiempo”</a:t>
+            </a:r>
+          </a:p>
+        </p:txBody>
+      </p:sp>
+      <p:sp>
+        <p:nvSpPr>
+          <p:cNvPr id="5" name="Content Placeholder 2">
+            <a:extLst>
+              <a:ext uri="{FF2B5EF4-FFF2-40B4-BE49-F238E27FC236}">
+                <a16:creationId xmlns:a16="http://schemas.microsoft.com/office/drawing/2014/main" id="{A612B8D7-64E4-8687-D43B-3913E7A1140A}"/>
+              </a:ext>
+            </a:extLst>
+          </p:cNvPr>
+          <p:cNvSpPr txBox="1">
+            <a:spLocks/>
+          </p:cNvSpPr>
+          <p:nvPr/>
+        </p:nvSpPr>
+        <p:spPr>
+          <a:xfrm>
+            <a:off x="6297168" y="809245"/>
+            <a:ext cx="2755392" cy="1792223"/>
+          </a:xfrm>
+          <a:prstGeom prst="rect">
+            <a:avLst/>
+          </a:prstGeom>
+          <a:ln>
+            <a:solidFill>
+              <a:schemeClr val="accent1"/>
+            </a:solidFill>
+          </a:ln>
+        </p:spPr>
+        <p:txBody>
+          <a:bodyPr vert="horz" lIns="91440" tIns="45720" rIns="91440" bIns="45720" rtlCol="0">
+            <a:normAutofit/>
+          </a:bodyPr>
+          <a:lstStyle>
+            <a:lvl1pPr marL="228600" indent="-228600" algn="l" defTabSz="914400" rtl="0" eaLnBrk="1" latinLnBrk="0" hangingPunct="1">
+              <a:lnSpc>
+                <a:spcPct val="90000"/>
+              </a:lnSpc>
+              <a:spcBef>
+                <a:spcPts val="1000"/>
+              </a:spcBef>
+              <a:buFont typeface="Arial" panose="020B0604020202020204" pitchFamily="34" charset="0"/>
+              <a:buChar char="•"/>
+              <a:defRPr sz="2800" kern="1200">
+                <a:solidFill>
+                  <a:schemeClr val="tx1"/>
+                </a:solidFill>
+                <a:latin typeface="+mn-lt"/>
+                <a:ea typeface="+mn-ea"/>
+                <a:cs typeface="+mn-cs"/>
+              </a:defRPr>
+            </a:lvl1pPr>
+            <a:lvl2pPr marL="685800" indent="-228600" algn="l" defTabSz="914400" rtl="0" eaLnBrk="1" latinLnBrk="0" hangingPunct="1">
+              <a:lnSpc>
+                <a:spcPct val="90000"/>
+              </a:lnSpc>
+              <a:spcBef>
+                <a:spcPts val="500"/>
+              </a:spcBef>
+              <a:buFont typeface="Arial" panose="020B0604020202020204" pitchFamily="34" charset="0"/>
+              <a:buChar char="•"/>
+              <a:defRPr sz="2400" kern="1200">
+                <a:solidFill>
+                  <a:schemeClr val="tx1"/>
+                </a:solidFill>
+                <a:latin typeface="+mn-lt"/>
+                <a:ea typeface="+mn-ea"/>
+                <a:cs typeface="+mn-cs"/>
+              </a:defRPr>
+            </a:lvl2pPr>
+            <a:lvl3pPr marL="1143000" indent="-228600" algn="l" defTabSz="914400" rtl="0" eaLnBrk="1" latinLnBrk="0" hangingPunct="1">
+              <a:lnSpc>
+                <a:spcPct val="90000"/>
+              </a:lnSpc>
+              <a:spcBef>
+                <a:spcPts val="500"/>
+              </a:spcBef>
+              <a:buFont typeface="Arial" panose="020B0604020202020204" pitchFamily="34" charset="0"/>
+              <a:buChar char="•"/>
+              <a:defRPr sz="2000" kern="1200">
+                <a:solidFill>
+                  <a:schemeClr val="tx1"/>
+                </a:solidFill>
+                <a:latin typeface="+mn-lt"/>
+                <a:ea typeface="+mn-ea"/>
+                <a:cs typeface="+mn-cs"/>
+              </a:defRPr>
+            </a:lvl3pPr>
+            <a:lvl4pPr marL="1600200" indent="-228600" algn="l" defTabSz="914400" rtl="0" eaLnBrk="1" latinLnBrk="0" hangingPunct="1">
+              <a:lnSpc>
+                <a:spcPct val="90000"/>
+              </a:lnSpc>
+              <a:spcBef>
+                <a:spcPts val="500"/>
+              </a:spcBef>
+              <a:buFont typeface="Arial" panose="020B0604020202020204" pitchFamily="34" charset="0"/>
+              <a:buChar char="•"/>
+              <a:defRPr sz="1800" kern="1200">
+                <a:solidFill>
+                  <a:schemeClr val="tx1"/>
+                </a:solidFill>
+                <a:latin typeface="+mn-lt"/>
+                <a:ea typeface="+mn-ea"/>
+                <a:cs typeface="+mn-cs"/>
+              </a:defRPr>
+            </a:lvl4pPr>
+            <a:lvl5pPr marL="2057400" indent="-228600" algn="l" defTabSz="914400" rtl="0" eaLnBrk="1" latinLnBrk="0" hangingPunct="1">
+              <a:lnSpc>
+                <a:spcPct val="90000"/>
+              </a:lnSpc>
+              <a:spcBef>
+                <a:spcPts val="500"/>
+              </a:spcBef>
+              <a:buFont typeface="Arial" panose="020B0604020202020204" pitchFamily="34" charset="0"/>
+              <a:buChar char="•"/>
+              <a:defRPr sz="1800" kern="1200">
+                <a:solidFill>
+                  <a:schemeClr val="tx1"/>
+                </a:solidFill>
+                <a:latin typeface="+mn-lt"/>
+                <a:ea typeface="+mn-ea"/>
+                <a:cs typeface="+mn-cs"/>
+              </a:defRPr>
+            </a:lvl5pPr>
+            <a:lvl6pPr marL="2514600" indent="-228600" algn="l" defTabSz="914400" rtl="0" eaLnBrk="1" latinLnBrk="0" hangingPunct="1">
+              <a:lnSpc>
+                <a:spcPct val="90000"/>
+              </a:lnSpc>
+              <a:spcBef>
+                <a:spcPts val="500"/>
+              </a:spcBef>
+              <a:buFont typeface="Arial" panose="020B0604020202020204" pitchFamily="34" charset="0"/>
+              <a:buChar char="•"/>
+              <a:defRPr sz="1800" kern="1200">
+                <a:solidFill>
+                  <a:schemeClr val="tx1"/>
+                </a:solidFill>
+                <a:latin typeface="+mn-lt"/>
+                <a:ea typeface="+mn-ea"/>
+                <a:cs typeface="+mn-cs"/>
+              </a:defRPr>
+            </a:lvl6pPr>
+            <a:lvl7pPr marL="2971800" indent="-228600" algn="l" defTabSz="914400" rtl="0" eaLnBrk="1" latinLnBrk="0" hangingPunct="1">
+              <a:lnSpc>
+                <a:spcPct val="90000"/>
+              </a:lnSpc>
+              <a:spcBef>
+                <a:spcPts val="500"/>
+              </a:spcBef>
+              <a:buFont typeface="Arial" panose="020B0604020202020204" pitchFamily="34" charset="0"/>
+              <a:buChar char="•"/>
+              <a:defRPr sz="1800" kern="1200">
+                <a:solidFill>
+                  <a:schemeClr val="tx1"/>
+                </a:solidFill>
+                <a:latin typeface="+mn-lt"/>
+                <a:ea typeface="+mn-ea"/>
+                <a:cs typeface="+mn-cs"/>
+              </a:defRPr>
+            </a:lvl7pPr>
+            <a:lvl8pPr marL="3429000" indent="-228600" algn="l" defTabSz="914400" rtl="0" eaLnBrk="1" latinLnBrk="0" hangingPunct="1">
+              <a:lnSpc>
+                <a:spcPct val="90000"/>
+              </a:lnSpc>
+              <a:spcBef>
+                <a:spcPts val="500"/>
+              </a:spcBef>
+              <a:buFont typeface="Arial" panose="020B0604020202020204" pitchFamily="34" charset="0"/>
+              <a:buChar char="•"/>
+              <a:defRPr sz="1800" kern="1200">
+                <a:solidFill>
+                  <a:schemeClr val="tx1"/>
+                </a:solidFill>
+                <a:latin typeface="+mn-lt"/>
+                <a:ea typeface="+mn-ea"/>
+                <a:cs typeface="+mn-cs"/>
+              </a:defRPr>
+            </a:lvl8pPr>
+            <a:lvl9pPr marL="3886200" indent="-228600" algn="l" defTabSz="914400" rtl="0" eaLnBrk="1" latinLnBrk="0" hangingPunct="1">
+              <a:lnSpc>
+                <a:spcPct val="90000"/>
+              </a:lnSpc>
+              <a:spcBef>
+                <a:spcPts val="500"/>
+              </a:spcBef>
+              <a:buFont typeface="Arial" panose="020B0604020202020204" pitchFamily="34" charset="0"/>
+              <a:buChar char="•"/>
+              <a:defRPr sz="1800" kern="1200">
+                <a:solidFill>
+                  <a:schemeClr val="tx1"/>
+                </a:solidFill>
+                <a:latin typeface="+mn-lt"/>
+                <a:ea typeface="+mn-ea"/>
+                <a:cs typeface="+mn-cs"/>
+              </a:defRPr>
+            </a:lvl9pPr>
+          </a:lstStyle>
+          <a:p>
+            <a:r>
+              <a:rPr lang="es-ES_tradnl" sz="1400" dirty="0"/>
+              <a:t>Objetivo específico 1</a:t>
+            </a:r>
+          </a:p>
+          <a:p>
+            <a:pPr marL="0" indent="0">
+              <a:buNone/>
+            </a:pPr>
+            <a:r>
+              <a:rPr lang="es-ES_tradnl" sz="1400" dirty="0"/>
+              <a:t>Analizar las variables del </a:t>
+            </a:r>
+            <a:r>
+              <a:rPr lang="es-ES_tradnl" sz="1400" dirty="0" err="1"/>
+              <a:t>Manifesto</a:t>
+            </a:r>
+            <a:r>
+              <a:rPr lang="es-ES_tradnl" sz="1400" dirty="0"/>
+              <a:t> Project relacionadas con la corrupción, y cómo estas se distribuyen en los programas de gobierno de los países</a:t>
+            </a:r>
+          </a:p>
+          <a:p>
+            <a:pPr marL="0" indent="0">
+              <a:buFont typeface="Arial" panose="020B0604020202020204" pitchFamily="34" charset="0"/>
+              <a:buNone/>
+            </a:pPr>
+            <a:endParaRPr lang="es-ES_tradnl" sz="1400" dirty="0"/>
+          </a:p>
+        </p:txBody>
+      </p:sp>
+      <p:sp>
+        <p:nvSpPr>
+          <p:cNvPr id="6" name="Content Placeholder 2">
+            <a:extLst>
+              <a:ext uri="{FF2B5EF4-FFF2-40B4-BE49-F238E27FC236}">
+                <a16:creationId xmlns:a16="http://schemas.microsoft.com/office/drawing/2014/main" id="{0A133896-7A5D-01D2-AFCC-F1022AB279E3}"/>
+              </a:ext>
+            </a:extLst>
+          </p:cNvPr>
+          <p:cNvSpPr txBox="1">
+            <a:spLocks/>
+          </p:cNvSpPr>
+          <p:nvPr/>
+        </p:nvSpPr>
+        <p:spPr>
+          <a:xfrm>
+            <a:off x="6297168" y="2871852"/>
+            <a:ext cx="2755392" cy="1792223"/>
+          </a:xfrm>
+          <a:prstGeom prst="rect">
+            <a:avLst/>
+          </a:prstGeom>
+          <a:ln>
+            <a:solidFill>
+              <a:schemeClr val="accent1"/>
+            </a:solidFill>
+          </a:ln>
+        </p:spPr>
+        <p:txBody>
+          <a:bodyPr vert="horz" lIns="91440" tIns="45720" rIns="91440" bIns="45720" rtlCol="0">
+            <a:normAutofit/>
+          </a:bodyPr>
+          <a:lstStyle>
+            <a:defPPr>
+              <a:defRPr lang="en-CL"/>
+            </a:defPPr>
+            <a:lvl1pPr marL="228600" indent="-228600">
+              <a:lnSpc>
+                <a:spcPct val="90000"/>
+              </a:lnSpc>
+              <a:spcBef>
+                <a:spcPts val="1000"/>
+              </a:spcBef>
+              <a:buFont typeface="Arial" panose="020B0604020202020204" pitchFamily="34" charset="0"/>
+              <a:buChar char="•"/>
+              <a:defRPr sz="1400"/>
+            </a:lvl1pPr>
+            <a:lvl2pPr marL="685800" indent="-228600">
+              <a:lnSpc>
+                <a:spcPct val="90000"/>
+              </a:lnSpc>
+              <a:spcBef>
+                <a:spcPts val="500"/>
+              </a:spcBef>
+              <a:buFont typeface="Arial" panose="020B0604020202020204" pitchFamily="34" charset="0"/>
+              <a:buChar char="•"/>
+              <a:defRPr sz="2400"/>
+            </a:lvl2pPr>
+            <a:lvl3pPr marL="1143000" indent="-228600">
+              <a:lnSpc>
+                <a:spcPct val="90000"/>
+              </a:lnSpc>
+              <a:spcBef>
+                <a:spcPts val="500"/>
+              </a:spcBef>
+              <a:buFont typeface="Arial" panose="020B0604020202020204" pitchFamily="34" charset="0"/>
+              <a:buChar char="•"/>
+              <a:defRPr sz="2000"/>
+            </a:lvl3pPr>
+            <a:lvl4pPr marL="1600200" indent="-228600">
+              <a:lnSpc>
+                <a:spcPct val="90000"/>
+              </a:lnSpc>
+              <a:spcBef>
+                <a:spcPts val="500"/>
+              </a:spcBef>
+              <a:buFont typeface="Arial" panose="020B0604020202020204" pitchFamily="34" charset="0"/>
+              <a:buChar char="•"/>
+            </a:lvl4pPr>
+            <a:lvl5pPr marL="2057400" indent="-228600">
+              <a:lnSpc>
+                <a:spcPct val="90000"/>
+              </a:lnSpc>
+              <a:spcBef>
+                <a:spcPts val="500"/>
+              </a:spcBef>
+              <a:buFont typeface="Arial" panose="020B0604020202020204" pitchFamily="34" charset="0"/>
+              <a:buChar char="•"/>
+            </a:lvl5pPr>
+            <a:lvl6pPr marL="2514600" indent="-228600">
+              <a:lnSpc>
+                <a:spcPct val="90000"/>
+              </a:lnSpc>
+              <a:spcBef>
+                <a:spcPts val="500"/>
+              </a:spcBef>
+              <a:buFont typeface="Arial" panose="020B0604020202020204" pitchFamily="34" charset="0"/>
+              <a:buChar char="•"/>
+            </a:lvl6pPr>
+            <a:lvl7pPr marL="2971800" indent="-228600">
+              <a:lnSpc>
+                <a:spcPct val="90000"/>
+              </a:lnSpc>
+              <a:spcBef>
+                <a:spcPts val="500"/>
+              </a:spcBef>
+              <a:buFont typeface="Arial" panose="020B0604020202020204" pitchFamily="34" charset="0"/>
+              <a:buChar char="•"/>
+            </a:lvl7pPr>
+            <a:lvl8pPr marL="3429000" indent="-228600">
+              <a:lnSpc>
+                <a:spcPct val="90000"/>
+              </a:lnSpc>
+              <a:spcBef>
+                <a:spcPts val="500"/>
+              </a:spcBef>
+              <a:buFont typeface="Arial" panose="020B0604020202020204" pitchFamily="34" charset="0"/>
+              <a:buChar char="•"/>
+            </a:lvl8pPr>
+            <a:lvl9pPr marL="3886200" indent="-228600">
+              <a:lnSpc>
+                <a:spcPct val="90000"/>
+              </a:lnSpc>
+              <a:spcBef>
+                <a:spcPts val="500"/>
+              </a:spcBef>
+              <a:buFont typeface="Arial" panose="020B0604020202020204" pitchFamily="34" charset="0"/>
+              <a:buChar char="•"/>
+            </a:lvl9pPr>
+          </a:lstStyle>
+          <a:p>
+            <a:r>
+              <a:rPr lang="es-ES_tradnl" dirty="0"/>
+              <a:t>Objetivo específico 2</a:t>
+            </a:r>
+          </a:p>
+          <a:p>
+            <a:pPr marL="0" indent="0">
+              <a:buNone/>
+            </a:pPr>
+            <a:r>
+              <a:rPr lang="es-ES_tradnl" dirty="0"/>
+              <a:t>Detectar comunidades de países: Aplicar técnicas de </a:t>
+            </a:r>
+            <a:r>
+              <a:rPr lang="es-ES_tradnl" dirty="0" err="1"/>
+              <a:t>clustering</a:t>
+            </a:r>
+            <a:r>
+              <a:rPr lang="es-ES_tradnl" dirty="0"/>
+              <a:t> para identificar comunidades de países en base a sus programas de gobierno y analizar su composición en diferentes períodos de tiempo</a:t>
+            </a:r>
+          </a:p>
+        </p:txBody>
+      </p:sp>
+      <p:sp>
+        <p:nvSpPr>
+          <p:cNvPr id="7" name="Content Placeholder 2">
+            <a:extLst>
+              <a:ext uri="{FF2B5EF4-FFF2-40B4-BE49-F238E27FC236}">
+                <a16:creationId xmlns:a16="http://schemas.microsoft.com/office/drawing/2014/main" id="{94458E31-208F-B68D-B02B-404A9AF42DAB}"/>
+              </a:ext>
+            </a:extLst>
+          </p:cNvPr>
+          <p:cNvSpPr txBox="1">
+            <a:spLocks/>
+          </p:cNvSpPr>
+          <p:nvPr/>
+        </p:nvSpPr>
+        <p:spPr>
+          <a:xfrm>
+            <a:off x="6297168" y="4934459"/>
+            <a:ext cx="2755392" cy="1792223"/>
+          </a:xfrm>
+          <a:prstGeom prst="rect">
+            <a:avLst/>
+          </a:prstGeom>
+          <a:ln>
+            <a:solidFill>
+              <a:schemeClr val="accent1"/>
+            </a:solidFill>
+          </a:ln>
+        </p:spPr>
+        <p:txBody>
+          <a:bodyPr vert="horz" lIns="91440" tIns="45720" rIns="91440" bIns="45720" rtlCol="0">
+            <a:normAutofit/>
+          </a:bodyPr>
+          <a:lstStyle>
+            <a:defPPr>
+              <a:defRPr lang="en-CL"/>
+            </a:defPPr>
+            <a:lvl1pPr marL="228600" indent="-228600">
+              <a:lnSpc>
+                <a:spcPct val="90000"/>
+              </a:lnSpc>
+              <a:spcBef>
+                <a:spcPts val="1000"/>
+              </a:spcBef>
+              <a:buFont typeface="Arial" panose="020B0604020202020204" pitchFamily="34" charset="0"/>
+              <a:buChar char="•"/>
+              <a:defRPr sz="1400"/>
+            </a:lvl1pPr>
+            <a:lvl2pPr marL="685800" indent="-228600">
+              <a:lnSpc>
+                <a:spcPct val="90000"/>
+              </a:lnSpc>
+              <a:spcBef>
+                <a:spcPts val="500"/>
+              </a:spcBef>
+              <a:buFont typeface="Arial" panose="020B0604020202020204" pitchFamily="34" charset="0"/>
+              <a:buChar char="•"/>
+              <a:defRPr sz="2400"/>
+            </a:lvl2pPr>
+            <a:lvl3pPr marL="1143000" indent="-228600">
+              <a:lnSpc>
+                <a:spcPct val="90000"/>
+              </a:lnSpc>
+              <a:spcBef>
+                <a:spcPts val="500"/>
+              </a:spcBef>
+              <a:buFont typeface="Arial" panose="020B0604020202020204" pitchFamily="34" charset="0"/>
+              <a:buChar char="•"/>
+              <a:defRPr sz="2000"/>
+            </a:lvl3pPr>
+            <a:lvl4pPr marL="1600200" indent="-228600">
+              <a:lnSpc>
+                <a:spcPct val="90000"/>
+              </a:lnSpc>
+              <a:spcBef>
+                <a:spcPts val="500"/>
+              </a:spcBef>
+              <a:buFont typeface="Arial" panose="020B0604020202020204" pitchFamily="34" charset="0"/>
+              <a:buChar char="•"/>
+            </a:lvl4pPr>
+            <a:lvl5pPr marL="2057400" indent="-228600">
+              <a:lnSpc>
+                <a:spcPct val="90000"/>
+              </a:lnSpc>
+              <a:spcBef>
+                <a:spcPts val="500"/>
+              </a:spcBef>
+              <a:buFont typeface="Arial" panose="020B0604020202020204" pitchFamily="34" charset="0"/>
+              <a:buChar char="•"/>
+            </a:lvl5pPr>
+            <a:lvl6pPr marL="2514600" indent="-228600">
+              <a:lnSpc>
+                <a:spcPct val="90000"/>
+              </a:lnSpc>
+              <a:spcBef>
+                <a:spcPts val="500"/>
+              </a:spcBef>
+              <a:buFont typeface="Arial" panose="020B0604020202020204" pitchFamily="34" charset="0"/>
+              <a:buChar char="•"/>
+            </a:lvl6pPr>
+            <a:lvl7pPr marL="2971800" indent="-228600">
+              <a:lnSpc>
+                <a:spcPct val="90000"/>
+              </a:lnSpc>
+              <a:spcBef>
+                <a:spcPts val="500"/>
+              </a:spcBef>
+              <a:buFont typeface="Arial" panose="020B0604020202020204" pitchFamily="34" charset="0"/>
+              <a:buChar char="•"/>
+            </a:lvl7pPr>
+            <a:lvl8pPr marL="3429000" indent="-228600">
+              <a:lnSpc>
+                <a:spcPct val="90000"/>
+              </a:lnSpc>
+              <a:spcBef>
+                <a:spcPts val="500"/>
+              </a:spcBef>
+              <a:buFont typeface="Arial" panose="020B0604020202020204" pitchFamily="34" charset="0"/>
+              <a:buChar char="•"/>
+            </a:lvl8pPr>
+            <a:lvl9pPr marL="3886200" indent="-228600">
+              <a:lnSpc>
+                <a:spcPct val="90000"/>
+              </a:lnSpc>
+              <a:spcBef>
+                <a:spcPts val="500"/>
+              </a:spcBef>
+              <a:buFont typeface="Arial" panose="020B0604020202020204" pitchFamily="34" charset="0"/>
+              <a:buChar char="•"/>
+            </a:lvl9pPr>
+          </a:lstStyle>
+          <a:p>
+            <a:r>
+              <a:rPr lang="es-ES_tradnl" dirty="0"/>
+              <a:t>Objetivo específico 3</a:t>
+            </a:r>
+          </a:p>
+          <a:p>
+            <a:pPr marL="0" indent="0">
+              <a:buNone/>
+            </a:pPr>
+            <a:r>
+              <a:rPr lang="es-ES_tradnl" dirty="0"/>
+              <a:t>Calcular y visualizar las diferencias en las variables relacionadas con la corrupción y las áreas temáticas principales entre las comunidades detectadas</a:t>
+            </a:r>
+          </a:p>
+        </p:txBody>
+      </p:sp>
+      <p:sp>
+        <p:nvSpPr>
+          <p:cNvPr id="8" name="Content Placeholder 2">
+            <a:extLst>
+              <a:ext uri="{FF2B5EF4-FFF2-40B4-BE49-F238E27FC236}">
+                <a16:creationId xmlns:a16="http://schemas.microsoft.com/office/drawing/2014/main" id="{45036D6C-2316-0510-4722-5BA407FEC72B}"/>
+              </a:ext>
+            </a:extLst>
+          </p:cNvPr>
+          <p:cNvSpPr txBox="1">
+            <a:spLocks/>
+          </p:cNvSpPr>
+          <p:nvPr/>
+        </p:nvSpPr>
+        <p:spPr>
+          <a:xfrm>
+            <a:off x="9277609" y="809245"/>
+            <a:ext cx="2755392" cy="1792223"/>
+          </a:xfrm>
+          <a:prstGeom prst="rect">
+            <a:avLst/>
+          </a:prstGeom>
+          <a:ln>
+            <a:solidFill>
+              <a:schemeClr val="accent1"/>
+            </a:solidFill>
+          </a:ln>
+        </p:spPr>
+        <p:txBody>
+          <a:bodyPr vert="horz" lIns="91440" tIns="45720" rIns="91440" bIns="45720" rtlCol="0">
+            <a:normAutofit/>
+          </a:bodyPr>
+          <a:lstStyle>
+            <a:lvl1pPr marL="228600" indent="-228600" algn="l" defTabSz="914400" rtl="0" eaLnBrk="1" latinLnBrk="0" hangingPunct="1">
+              <a:lnSpc>
+                <a:spcPct val="90000"/>
+              </a:lnSpc>
+              <a:spcBef>
+                <a:spcPts val="1000"/>
+              </a:spcBef>
+              <a:buFont typeface="Arial" panose="020B0604020202020204" pitchFamily="34" charset="0"/>
+              <a:buChar char="•"/>
+              <a:defRPr sz="2800" kern="1200">
+                <a:solidFill>
+                  <a:schemeClr val="tx1"/>
+                </a:solidFill>
+                <a:latin typeface="+mn-lt"/>
+                <a:ea typeface="+mn-ea"/>
+                <a:cs typeface="+mn-cs"/>
+              </a:defRPr>
+            </a:lvl1pPr>
+            <a:lvl2pPr marL="685800" indent="-228600" algn="l" defTabSz="914400" rtl="0" eaLnBrk="1" latinLnBrk="0" hangingPunct="1">
+              <a:lnSpc>
+                <a:spcPct val="90000"/>
+              </a:lnSpc>
+              <a:spcBef>
+                <a:spcPts val="500"/>
+              </a:spcBef>
+              <a:buFont typeface="Arial" panose="020B0604020202020204" pitchFamily="34" charset="0"/>
+              <a:buChar char="•"/>
+              <a:defRPr sz="2400" kern="1200">
+                <a:solidFill>
+                  <a:schemeClr val="tx1"/>
+                </a:solidFill>
+                <a:latin typeface="+mn-lt"/>
+                <a:ea typeface="+mn-ea"/>
+                <a:cs typeface="+mn-cs"/>
+              </a:defRPr>
+            </a:lvl2pPr>
+            <a:lvl3pPr marL="1143000" indent="-228600" algn="l" defTabSz="914400" rtl="0" eaLnBrk="1" latinLnBrk="0" hangingPunct="1">
+              <a:lnSpc>
+                <a:spcPct val="90000"/>
+              </a:lnSpc>
+              <a:spcBef>
+                <a:spcPts val="500"/>
+              </a:spcBef>
+              <a:buFont typeface="Arial" panose="020B0604020202020204" pitchFamily="34" charset="0"/>
+              <a:buChar char="•"/>
+              <a:defRPr sz="2000" kern="1200">
+                <a:solidFill>
+                  <a:schemeClr val="tx1"/>
+                </a:solidFill>
+                <a:latin typeface="+mn-lt"/>
+                <a:ea typeface="+mn-ea"/>
+                <a:cs typeface="+mn-cs"/>
+              </a:defRPr>
+            </a:lvl3pPr>
+            <a:lvl4pPr marL="1600200" indent="-228600" algn="l" defTabSz="914400" rtl="0" eaLnBrk="1" latinLnBrk="0" hangingPunct="1">
+              <a:lnSpc>
+                <a:spcPct val="90000"/>
+              </a:lnSpc>
+              <a:spcBef>
+                <a:spcPts val="500"/>
+              </a:spcBef>
+              <a:buFont typeface="Arial" panose="020B0604020202020204" pitchFamily="34" charset="0"/>
+              <a:buChar char="•"/>
+              <a:defRPr sz="1800" kern="1200">
+                <a:solidFill>
+                  <a:schemeClr val="tx1"/>
+                </a:solidFill>
+                <a:latin typeface="+mn-lt"/>
+                <a:ea typeface="+mn-ea"/>
+                <a:cs typeface="+mn-cs"/>
+              </a:defRPr>
+            </a:lvl4pPr>
+            <a:lvl5pPr marL="2057400" indent="-228600" algn="l" defTabSz="914400" rtl="0" eaLnBrk="1" latinLnBrk="0" hangingPunct="1">
+              <a:lnSpc>
+                <a:spcPct val="90000"/>
+              </a:lnSpc>
+              <a:spcBef>
+                <a:spcPts val="500"/>
+              </a:spcBef>
+              <a:buFont typeface="Arial" panose="020B0604020202020204" pitchFamily="34" charset="0"/>
+              <a:buChar char="•"/>
+              <a:defRPr sz="1800" kern="1200">
+                <a:solidFill>
+                  <a:schemeClr val="tx1"/>
+                </a:solidFill>
+                <a:latin typeface="+mn-lt"/>
+                <a:ea typeface="+mn-ea"/>
+                <a:cs typeface="+mn-cs"/>
+              </a:defRPr>
+            </a:lvl5pPr>
+            <a:lvl6pPr marL="2514600" indent="-228600" algn="l" defTabSz="914400" rtl="0" eaLnBrk="1" latinLnBrk="0" hangingPunct="1">
+              <a:lnSpc>
+                <a:spcPct val="90000"/>
+              </a:lnSpc>
+              <a:spcBef>
+                <a:spcPts val="500"/>
+              </a:spcBef>
+              <a:buFont typeface="Arial" panose="020B0604020202020204" pitchFamily="34" charset="0"/>
+              <a:buChar char="•"/>
+              <a:defRPr sz="1800" kern="1200">
+                <a:solidFill>
+                  <a:schemeClr val="tx1"/>
+                </a:solidFill>
+                <a:latin typeface="+mn-lt"/>
+                <a:ea typeface="+mn-ea"/>
+                <a:cs typeface="+mn-cs"/>
+              </a:defRPr>
+            </a:lvl6pPr>
+            <a:lvl7pPr marL="2971800" indent="-228600" algn="l" defTabSz="914400" rtl="0" eaLnBrk="1" latinLnBrk="0" hangingPunct="1">
+              <a:lnSpc>
+                <a:spcPct val="90000"/>
+              </a:lnSpc>
+              <a:spcBef>
+                <a:spcPts val="500"/>
+              </a:spcBef>
+              <a:buFont typeface="Arial" panose="020B0604020202020204" pitchFamily="34" charset="0"/>
+              <a:buChar char="•"/>
+              <a:defRPr sz="1800" kern="1200">
+                <a:solidFill>
+                  <a:schemeClr val="tx1"/>
+                </a:solidFill>
+                <a:latin typeface="+mn-lt"/>
+                <a:ea typeface="+mn-ea"/>
+                <a:cs typeface="+mn-cs"/>
+              </a:defRPr>
+            </a:lvl7pPr>
+            <a:lvl8pPr marL="3429000" indent="-228600" algn="l" defTabSz="914400" rtl="0" eaLnBrk="1" latinLnBrk="0" hangingPunct="1">
+              <a:lnSpc>
+                <a:spcPct val="90000"/>
+              </a:lnSpc>
+              <a:spcBef>
+                <a:spcPts val="500"/>
+              </a:spcBef>
+              <a:buFont typeface="Arial" panose="020B0604020202020204" pitchFamily="34" charset="0"/>
+              <a:buChar char="•"/>
+              <a:defRPr sz="1800" kern="1200">
+                <a:solidFill>
+                  <a:schemeClr val="tx1"/>
+                </a:solidFill>
+                <a:latin typeface="+mn-lt"/>
+                <a:ea typeface="+mn-ea"/>
+                <a:cs typeface="+mn-cs"/>
+              </a:defRPr>
+            </a:lvl8pPr>
+            <a:lvl9pPr marL="3886200" indent="-228600" algn="l" defTabSz="914400" rtl="0" eaLnBrk="1" latinLnBrk="0" hangingPunct="1">
+              <a:lnSpc>
+                <a:spcPct val="90000"/>
+              </a:lnSpc>
+              <a:spcBef>
+                <a:spcPts val="500"/>
+              </a:spcBef>
+              <a:buFont typeface="Arial" panose="020B0604020202020204" pitchFamily="34" charset="0"/>
+              <a:buChar char="•"/>
+              <a:defRPr sz="1800" kern="1200">
+                <a:solidFill>
+                  <a:schemeClr val="tx1"/>
+                </a:solidFill>
+                <a:latin typeface="+mn-lt"/>
+                <a:ea typeface="+mn-ea"/>
+                <a:cs typeface="+mn-cs"/>
+              </a:defRPr>
+            </a:lvl9pPr>
+          </a:lstStyle>
+          <a:p>
+            <a:r>
+              <a:rPr lang="es-ES_tradnl" sz="1400" dirty="0"/>
+              <a:t>Objetivo específico 4</a:t>
+            </a:r>
+          </a:p>
+          <a:p>
+            <a:pPr marL="0" indent="0">
+              <a:buFont typeface="Arial" panose="020B0604020202020204" pitchFamily="34" charset="0"/>
+              <a:buNone/>
+            </a:pPr>
+            <a:r>
+              <a:rPr lang="es-ES_tradnl" sz="1400" dirty="0"/>
+              <a:t>Visualizar coincidencias entre países: Construir </a:t>
+            </a:r>
+            <a:r>
+              <a:rPr lang="es-ES_tradnl" sz="1400" dirty="0" err="1"/>
+              <a:t>heatmaps</a:t>
+            </a:r>
+            <a:r>
+              <a:rPr lang="es-ES_tradnl" sz="1400" dirty="0"/>
+              <a:t> (mapas de calor) y redes de coincidencias para entender cuántas veces los países comparten un mismo clúster en diferentes períodos</a:t>
+            </a:r>
+          </a:p>
+        </p:txBody>
+      </p:sp>
+      <p:sp>
+        <p:nvSpPr>
+          <p:cNvPr id="9" name="Content Placeholder 2">
+            <a:extLst>
+              <a:ext uri="{FF2B5EF4-FFF2-40B4-BE49-F238E27FC236}">
+                <a16:creationId xmlns:a16="http://schemas.microsoft.com/office/drawing/2014/main" id="{AB085438-38E7-72EC-DAB7-665C4F3564EF}"/>
+              </a:ext>
+            </a:extLst>
+          </p:cNvPr>
+          <p:cNvSpPr txBox="1">
+            <a:spLocks/>
+          </p:cNvSpPr>
+          <p:nvPr/>
+        </p:nvSpPr>
+        <p:spPr>
+          <a:xfrm>
+            <a:off x="9277609" y="2871851"/>
+            <a:ext cx="2755392" cy="1792223"/>
+          </a:xfrm>
+          <a:prstGeom prst="rect">
+            <a:avLst/>
+          </a:prstGeom>
+          <a:ln>
+            <a:solidFill>
+              <a:schemeClr val="accent1"/>
+            </a:solidFill>
+          </a:ln>
+        </p:spPr>
+        <p:txBody>
+          <a:bodyPr vert="horz" lIns="91440" tIns="45720" rIns="91440" bIns="45720" rtlCol="0">
+            <a:normAutofit/>
+          </a:bodyPr>
+          <a:lstStyle>
+            <a:defPPr>
+              <a:defRPr lang="en-CL"/>
+            </a:defPPr>
+            <a:lvl1pPr marL="228600" indent="-228600">
+              <a:lnSpc>
+                <a:spcPct val="90000"/>
+              </a:lnSpc>
+              <a:spcBef>
+                <a:spcPts val="1000"/>
+              </a:spcBef>
+              <a:buFont typeface="Arial" panose="020B0604020202020204" pitchFamily="34" charset="0"/>
+              <a:buChar char="•"/>
+              <a:defRPr sz="1400"/>
+            </a:lvl1pPr>
+            <a:lvl2pPr marL="685800" indent="-228600">
+              <a:lnSpc>
+                <a:spcPct val="90000"/>
+              </a:lnSpc>
+              <a:spcBef>
+                <a:spcPts val="500"/>
+              </a:spcBef>
+              <a:buFont typeface="Arial" panose="020B0604020202020204" pitchFamily="34" charset="0"/>
+              <a:buChar char="•"/>
+              <a:defRPr sz="2400"/>
+            </a:lvl2pPr>
+            <a:lvl3pPr marL="1143000" indent="-228600">
+              <a:lnSpc>
+                <a:spcPct val="90000"/>
+              </a:lnSpc>
+              <a:spcBef>
+                <a:spcPts val="500"/>
+              </a:spcBef>
+              <a:buFont typeface="Arial" panose="020B0604020202020204" pitchFamily="34" charset="0"/>
+              <a:buChar char="•"/>
+              <a:defRPr sz="2000"/>
+            </a:lvl3pPr>
+            <a:lvl4pPr marL="1600200" indent="-228600">
+              <a:lnSpc>
+                <a:spcPct val="90000"/>
+              </a:lnSpc>
+              <a:spcBef>
+                <a:spcPts val="500"/>
+              </a:spcBef>
+              <a:buFont typeface="Arial" panose="020B0604020202020204" pitchFamily="34" charset="0"/>
+              <a:buChar char="•"/>
+            </a:lvl4pPr>
+            <a:lvl5pPr marL="2057400" indent="-228600">
+              <a:lnSpc>
+                <a:spcPct val="90000"/>
+              </a:lnSpc>
+              <a:spcBef>
+                <a:spcPts val="500"/>
+              </a:spcBef>
+              <a:buFont typeface="Arial" panose="020B0604020202020204" pitchFamily="34" charset="0"/>
+              <a:buChar char="•"/>
+            </a:lvl5pPr>
+            <a:lvl6pPr marL="2514600" indent="-228600">
+              <a:lnSpc>
+                <a:spcPct val="90000"/>
+              </a:lnSpc>
+              <a:spcBef>
+                <a:spcPts val="500"/>
+              </a:spcBef>
+              <a:buFont typeface="Arial" panose="020B0604020202020204" pitchFamily="34" charset="0"/>
+              <a:buChar char="•"/>
+            </a:lvl6pPr>
+            <a:lvl7pPr marL="2971800" indent="-228600">
+              <a:lnSpc>
+                <a:spcPct val="90000"/>
+              </a:lnSpc>
+              <a:spcBef>
+                <a:spcPts val="500"/>
+              </a:spcBef>
+              <a:buFont typeface="Arial" panose="020B0604020202020204" pitchFamily="34" charset="0"/>
+              <a:buChar char="•"/>
+            </a:lvl7pPr>
+            <a:lvl8pPr marL="3429000" indent="-228600">
+              <a:lnSpc>
+                <a:spcPct val="90000"/>
+              </a:lnSpc>
+              <a:spcBef>
+                <a:spcPts val="500"/>
+              </a:spcBef>
+              <a:buFont typeface="Arial" panose="020B0604020202020204" pitchFamily="34" charset="0"/>
+              <a:buChar char="•"/>
+            </a:lvl8pPr>
+            <a:lvl9pPr marL="3886200" indent="-228600">
+              <a:lnSpc>
+                <a:spcPct val="90000"/>
+              </a:lnSpc>
+              <a:spcBef>
+                <a:spcPts val="500"/>
+              </a:spcBef>
+              <a:buFont typeface="Arial" panose="020B0604020202020204" pitchFamily="34" charset="0"/>
+              <a:buChar char="•"/>
+            </a:lvl9pPr>
+          </a:lstStyle>
+          <a:p>
+            <a:r>
+              <a:rPr lang="es-ES_tradnl" dirty="0"/>
+              <a:t>Objetivo específico 5</a:t>
+            </a:r>
+          </a:p>
+          <a:p>
+            <a:pPr marL="0" indent="0">
+              <a:buNone/>
+            </a:pPr>
+            <a:r>
+              <a:rPr lang="es-ES_tradnl" dirty="0"/>
+              <a:t>Caracterizar las comunidades en base a sus prioridades temáticas: Explorar si las comunidades detectadas reflejan diferencias estructurales relacionadas con características políticas, económicas o sociales</a:t>
+            </a:r>
+          </a:p>
+        </p:txBody>
+      </p:sp>
+    </p:spTree>
+    <p:extLst>
+      <p:ext uri="{BB962C8B-B14F-4D97-AF65-F5344CB8AC3E}">
+        <p14:creationId xmlns:p14="http://schemas.microsoft.com/office/powerpoint/2010/main" val="346241230"/>
+      </p:ext>
+    </p:extLst>
+  </p:cSld>
+  <p:clrMapOvr>
+    <a:masterClrMapping/>
+  </p:clrMapOvr>
+</p:sld>
+</file>
+
+<file path=ppt/slides/slide5.xml><?xml version="1.0" encoding="utf-8"?>
+<p:sld xmlns:a="http://schemas.openxmlformats.org/drawingml/2006/main" xmlns:r="http://schemas.openxmlformats.org/officeDocument/2006/relationships" xmlns:p="http://schemas.openxmlformats.org/presentationml/2006/main">
+  <p:cSld>
+    <p:spTree>
+      <p:nvGrpSpPr>
+        <p:cNvPr id="1" name="">
+          <a:extLst>
+            <a:ext uri="{FF2B5EF4-FFF2-40B4-BE49-F238E27FC236}">
+              <a16:creationId xmlns:a16="http://schemas.microsoft.com/office/drawing/2014/main" id="{E4F7BA6B-F02B-6F7E-6EFB-AE3589AFD871}"/>
+            </a:ext>
+          </a:extLst>
+        </p:cNvPr>
+        <p:cNvGrpSpPr/>
+        <p:nvPr/>
+      </p:nvGrpSpPr>
+      <p:grpSpPr>
+        <a:xfrm>
+          <a:off x="0" y="0"/>
+          <a:ext cx="0" cy="0"/>
+          <a:chOff x="0" y="0"/>
+          <a:chExt cx="0" cy="0"/>
+        </a:xfrm>
+      </p:grpSpPr>
+      <p:sp>
+        <p:nvSpPr>
+          <p:cNvPr id="2" name="Title 1">
+            <a:extLst>
+              <a:ext uri="{FF2B5EF4-FFF2-40B4-BE49-F238E27FC236}">
+                <a16:creationId xmlns:a16="http://schemas.microsoft.com/office/drawing/2014/main" id="{B1C5C22D-5BA7-4C4F-649C-1D9DB365473E}"/>
+              </a:ext>
+            </a:extLst>
+          </p:cNvPr>
+          <p:cNvSpPr>
+            <a:spLocks noGrp="1"/>
+          </p:cNvSpPr>
+          <p:nvPr>
+            <p:ph type="title"/>
+          </p:nvPr>
+        </p:nvSpPr>
+        <p:spPr>
+          <a:xfrm>
+            <a:off x="838200" y="200215"/>
+            <a:ext cx="10515600" cy="677291"/>
+          </a:xfrm>
+        </p:spPr>
+        <p:txBody>
+          <a:bodyPr>
+            <a:normAutofit/>
+          </a:bodyPr>
+          <a:lstStyle/>
+          <a:p>
+            <a:r>
+              <a:rPr lang="es-ES_tradnl" sz="3200" dirty="0"/>
+              <a:t>2.2 Descripción de los datos/ </a:t>
+            </a:r>
+            <a:r>
+              <a:rPr lang="es-ES_tradnl" sz="3200" dirty="0" err="1"/>
+              <a:t>Manifesto</a:t>
+            </a:r>
+            <a:r>
+              <a:rPr lang="es-ES_tradnl" sz="3200" dirty="0"/>
+              <a:t> Project</a:t>
+            </a:r>
+          </a:p>
+        </p:txBody>
+      </p:sp>
+      <p:sp>
+        <p:nvSpPr>
+          <p:cNvPr id="3" name="Content Placeholder 2">
+            <a:extLst>
+              <a:ext uri="{FF2B5EF4-FFF2-40B4-BE49-F238E27FC236}">
+                <a16:creationId xmlns:a16="http://schemas.microsoft.com/office/drawing/2014/main" id="{4185F84C-59D1-86CF-6629-F47BBB4B14DE}"/>
+              </a:ext>
+            </a:extLst>
+          </p:cNvPr>
+          <p:cNvSpPr>
+            <a:spLocks noGrp="1"/>
+          </p:cNvSpPr>
+          <p:nvPr>
+            <p:ph idx="1"/>
+          </p:nvPr>
+        </p:nvSpPr>
+        <p:spPr>
+          <a:xfrm>
+            <a:off x="838200" y="984017"/>
+            <a:ext cx="11190402" cy="402335"/>
+          </a:xfrm>
+        </p:spPr>
+        <p:txBody>
+          <a:bodyPr>
+            <a:noAutofit/>
+          </a:bodyPr>
+          <a:lstStyle/>
+          <a:p>
+            <a:r>
+              <a:rPr lang="es-ES_tradnl" sz="1800" dirty="0" err="1"/>
+              <a:t>Manifesto</a:t>
+            </a:r>
+            <a:r>
+              <a:rPr lang="es-ES_tradnl" sz="1800" dirty="0"/>
+              <a:t> Project</a:t>
+            </a:r>
+            <a:r>
+              <a:rPr lang="es-ES_tradnl" sz="2400" dirty="0"/>
+              <a:t>: </a:t>
+            </a:r>
+            <a:r>
+              <a:rPr lang="es-ES_tradnl" sz="1600" dirty="0">
+                <a:effectLst/>
+                <a:latin typeface="Helvetica" pitchFamily="2" charset="0"/>
+              </a:rPr>
+              <a:t>analiza los manifiestos electorales de los partidos políticos para estudiar sus preferencias políticas</a:t>
+            </a:r>
+          </a:p>
+          <a:p>
+            <a:endParaRPr lang="es-ES_tradnl" sz="1800" dirty="0"/>
+          </a:p>
+        </p:txBody>
+      </p:sp>
+      <p:sp>
+        <p:nvSpPr>
+          <p:cNvPr id="10" name="Content Placeholder 2">
+            <a:extLst>
+              <a:ext uri="{FF2B5EF4-FFF2-40B4-BE49-F238E27FC236}">
+                <a16:creationId xmlns:a16="http://schemas.microsoft.com/office/drawing/2014/main" id="{7A39983B-43AB-9B2F-66D2-1773E58331CD}"/>
+              </a:ext>
+            </a:extLst>
+          </p:cNvPr>
+          <p:cNvSpPr txBox="1">
+            <a:spLocks/>
+          </p:cNvSpPr>
+          <p:nvPr/>
+        </p:nvSpPr>
+        <p:spPr>
+          <a:xfrm>
+            <a:off x="838200" y="1481570"/>
+            <a:ext cx="10210014" cy="1584961"/>
+          </a:xfrm>
+          <a:prstGeom prst="rect">
+            <a:avLst/>
+          </a:prstGeom>
+        </p:spPr>
+        <p:txBody>
+          <a:bodyPr vert="horz" lIns="91440" tIns="45720" rIns="91440" bIns="45720" rtlCol="0">
+            <a:noAutofit/>
+          </a:bodyPr>
+          <a:lstStyle>
+            <a:lvl1pPr marL="228600" indent="-228600" algn="l" defTabSz="914400" rtl="0" eaLnBrk="1" latinLnBrk="0" hangingPunct="1">
+              <a:lnSpc>
+                <a:spcPct val="90000"/>
+              </a:lnSpc>
+              <a:spcBef>
+                <a:spcPts val="1000"/>
+              </a:spcBef>
+              <a:buFont typeface="Arial" panose="020B0604020202020204" pitchFamily="34" charset="0"/>
+              <a:buChar char="•"/>
+              <a:defRPr sz="2800" kern="1200">
+                <a:solidFill>
+                  <a:schemeClr val="tx1"/>
+                </a:solidFill>
+                <a:latin typeface="+mn-lt"/>
+                <a:ea typeface="+mn-ea"/>
+                <a:cs typeface="+mn-cs"/>
+              </a:defRPr>
+            </a:lvl1pPr>
+            <a:lvl2pPr marL="685800" indent="-228600" algn="l" defTabSz="914400" rtl="0" eaLnBrk="1" latinLnBrk="0" hangingPunct="1">
+              <a:lnSpc>
+                <a:spcPct val="90000"/>
+              </a:lnSpc>
+              <a:spcBef>
+                <a:spcPts val="500"/>
+              </a:spcBef>
+              <a:buFont typeface="Arial" panose="020B0604020202020204" pitchFamily="34" charset="0"/>
+              <a:buChar char="•"/>
+              <a:defRPr sz="2400" kern="1200">
+                <a:solidFill>
+                  <a:schemeClr val="tx1"/>
+                </a:solidFill>
+                <a:latin typeface="+mn-lt"/>
+                <a:ea typeface="+mn-ea"/>
+                <a:cs typeface="+mn-cs"/>
+              </a:defRPr>
+            </a:lvl2pPr>
+            <a:lvl3pPr marL="1143000" indent="-228600" algn="l" defTabSz="914400" rtl="0" eaLnBrk="1" latinLnBrk="0" hangingPunct="1">
+              <a:lnSpc>
+                <a:spcPct val="90000"/>
+              </a:lnSpc>
+              <a:spcBef>
+                <a:spcPts val="500"/>
+              </a:spcBef>
+              <a:buFont typeface="Arial" panose="020B0604020202020204" pitchFamily="34" charset="0"/>
+              <a:buChar char="•"/>
+              <a:defRPr sz="2000" kern="1200">
+                <a:solidFill>
+                  <a:schemeClr val="tx1"/>
+                </a:solidFill>
+                <a:latin typeface="+mn-lt"/>
+                <a:ea typeface="+mn-ea"/>
+                <a:cs typeface="+mn-cs"/>
+              </a:defRPr>
+            </a:lvl3pPr>
+            <a:lvl4pPr marL="1600200" indent="-228600" algn="l" defTabSz="914400" rtl="0" eaLnBrk="1" latinLnBrk="0" hangingPunct="1">
+              <a:lnSpc>
+                <a:spcPct val="90000"/>
+              </a:lnSpc>
+              <a:spcBef>
+                <a:spcPts val="500"/>
+              </a:spcBef>
+              <a:buFont typeface="Arial" panose="020B0604020202020204" pitchFamily="34" charset="0"/>
+              <a:buChar char="•"/>
+              <a:defRPr sz="1800" kern="1200">
+                <a:solidFill>
+                  <a:schemeClr val="tx1"/>
+                </a:solidFill>
+                <a:latin typeface="+mn-lt"/>
+                <a:ea typeface="+mn-ea"/>
+                <a:cs typeface="+mn-cs"/>
+              </a:defRPr>
+            </a:lvl4pPr>
+            <a:lvl5pPr marL="2057400" indent="-228600" algn="l" defTabSz="914400" rtl="0" eaLnBrk="1" latinLnBrk="0" hangingPunct="1">
+              <a:lnSpc>
+                <a:spcPct val="90000"/>
+              </a:lnSpc>
+              <a:spcBef>
+                <a:spcPts val="500"/>
+              </a:spcBef>
+              <a:buFont typeface="Arial" panose="020B0604020202020204" pitchFamily="34" charset="0"/>
+              <a:buChar char="•"/>
+              <a:defRPr sz="1800" kern="1200">
+                <a:solidFill>
+                  <a:schemeClr val="tx1"/>
+                </a:solidFill>
+                <a:latin typeface="+mn-lt"/>
+                <a:ea typeface="+mn-ea"/>
+                <a:cs typeface="+mn-cs"/>
+              </a:defRPr>
+            </a:lvl5pPr>
+            <a:lvl6pPr marL="2514600" indent="-228600" algn="l" defTabSz="914400" rtl="0" eaLnBrk="1" latinLnBrk="0" hangingPunct="1">
+              <a:lnSpc>
+                <a:spcPct val="90000"/>
+              </a:lnSpc>
+              <a:spcBef>
+                <a:spcPts val="500"/>
+              </a:spcBef>
+              <a:buFont typeface="Arial" panose="020B0604020202020204" pitchFamily="34" charset="0"/>
+              <a:buChar char="•"/>
+              <a:defRPr sz="1800" kern="1200">
+                <a:solidFill>
+                  <a:schemeClr val="tx1"/>
+                </a:solidFill>
+                <a:latin typeface="+mn-lt"/>
+                <a:ea typeface="+mn-ea"/>
+                <a:cs typeface="+mn-cs"/>
+              </a:defRPr>
+            </a:lvl6pPr>
+            <a:lvl7pPr marL="2971800" indent="-228600" algn="l" defTabSz="914400" rtl="0" eaLnBrk="1" latinLnBrk="0" hangingPunct="1">
+              <a:lnSpc>
+                <a:spcPct val="90000"/>
+              </a:lnSpc>
+              <a:spcBef>
+                <a:spcPts val="500"/>
+              </a:spcBef>
+              <a:buFont typeface="Arial" panose="020B0604020202020204" pitchFamily="34" charset="0"/>
+              <a:buChar char="•"/>
+              <a:defRPr sz="1800" kern="1200">
+                <a:solidFill>
+                  <a:schemeClr val="tx1"/>
+                </a:solidFill>
+                <a:latin typeface="+mn-lt"/>
+                <a:ea typeface="+mn-ea"/>
+                <a:cs typeface="+mn-cs"/>
+              </a:defRPr>
+            </a:lvl7pPr>
+            <a:lvl8pPr marL="3429000" indent="-228600" algn="l" defTabSz="914400" rtl="0" eaLnBrk="1" latinLnBrk="0" hangingPunct="1">
+              <a:lnSpc>
+                <a:spcPct val="90000"/>
+              </a:lnSpc>
+              <a:spcBef>
+                <a:spcPts val="500"/>
+              </a:spcBef>
+              <a:buFont typeface="Arial" panose="020B0604020202020204" pitchFamily="34" charset="0"/>
+              <a:buChar char="•"/>
+              <a:defRPr sz="1800" kern="1200">
+                <a:solidFill>
+                  <a:schemeClr val="tx1"/>
+                </a:solidFill>
+                <a:latin typeface="+mn-lt"/>
+                <a:ea typeface="+mn-ea"/>
+                <a:cs typeface="+mn-cs"/>
+              </a:defRPr>
+            </a:lvl8pPr>
+            <a:lvl9pPr marL="3886200" indent="-228600" algn="l" defTabSz="914400" rtl="0" eaLnBrk="1" latinLnBrk="0" hangingPunct="1">
+              <a:lnSpc>
+                <a:spcPct val="90000"/>
+              </a:lnSpc>
+              <a:spcBef>
+                <a:spcPts val="500"/>
+              </a:spcBef>
+              <a:buFont typeface="Arial" panose="020B0604020202020204" pitchFamily="34" charset="0"/>
+              <a:buChar char="•"/>
+              <a:defRPr sz="1800" kern="1200">
+                <a:solidFill>
+                  <a:schemeClr val="tx1"/>
+                </a:solidFill>
+                <a:latin typeface="+mn-lt"/>
+                <a:ea typeface="+mn-ea"/>
+                <a:cs typeface="+mn-cs"/>
+              </a:defRPr>
+            </a:lvl9pPr>
+          </a:lstStyle>
+          <a:p>
+            <a:r>
+              <a:rPr lang="es-ES_tradnl" sz="1800" dirty="0"/>
+              <a:t>Ejemplo de un </a:t>
+            </a:r>
+            <a:r>
+              <a:rPr lang="es-ES_tradnl" sz="1800" dirty="0" err="1"/>
+              <a:t>manifesto</a:t>
+            </a:r>
+            <a:r>
+              <a:rPr lang="es-ES_tradnl" sz="1800" dirty="0"/>
+              <a:t> etiquetado:</a:t>
+            </a:r>
+          </a:p>
+          <a:p>
+            <a:pPr marL="457200" lvl="1" indent="0">
+              <a:buNone/>
+            </a:pPr>
+            <a:r>
+              <a:rPr lang="es-ES_tradnl" sz="1400" dirty="0"/>
+              <a:t>Nombre archivo	: 155021_201311.csv</a:t>
+            </a:r>
+          </a:p>
+          <a:p>
+            <a:pPr marL="457200" lvl="1" indent="0">
+              <a:buNone/>
+            </a:pPr>
+            <a:r>
+              <a:rPr lang="es-ES_tradnl" sz="1400" dirty="0"/>
+              <a:t>155980	: Identificador del partido político (155=Chile, 021=correlativo asociado a M. Bachelet)</a:t>
+            </a:r>
+          </a:p>
+          <a:p>
+            <a:pPr marL="457200" lvl="1" indent="0">
+              <a:buNone/>
+            </a:pPr>
+            <a:r>
+              <a:rPr lang="es-ES_tradnl" sz="1400" dirty="0"/>
+              <a:t>2013    	: Año de la elección</a:t>
+            </a:r>
+          </a:p>
+          <a:p>
+            <a:pPr marL="457200" lvl="1" indent="0">
+              <a:buNone/>
+            </a:pPr>
+            <a:r>
+              <a:rPr lang="es-ES_tradnl" sz="1400" dirty="0"/>
+              <a:t>11        	: mes de la elección</a:t>
+            </a:r>
+          </a:p>
+          <a:p>
+            <a:pPr marL="457200" lvl="1" indent="0">
+              <a:buNone/>
+            </a:pPr>
+            <a:endParaRPr lang="es-ES_tradnl" sz="1400" dirty="0"/>
+          </a:p>
+        </p:txBody>
+      </p:sp>
+      <p:pic>
+        <p:nvPicPr>
+          <p:cNvPr id="5" name="Picture 4">
+            <a:extLst>
+              <a:ext uri="{FF2B5EF4-FFF2-40B4-BE49-F238E27FC236}">
+                <a16:creationId xmlns:a16="http://schemas.microsoft.com/office/drawing/2014/main" id="{BFED39FC-848D-D2CC-B2E9-49787239A98F}"/>
+              </a:ext>
+            </a:extLst>
+          </p:cNvPr>
+          <p:cNvPicPr>
+            <a:picLocks noChangeAspect="1"/>
+          </p:cNvPicPr>
+          <p:nvPr/>
+        </p:nvPicPr>
+        <p:blipFill>
+          <a:blip r:embed="rId3"/>
+          <a:stretch>
+            <a:fillRect/>
+          </a:stretch>
+        </p:blipFill>
+        <p:spPr>
+          <a:xfrm>
+            <a:off x="1143785" y="3161749"/>
+            <a:ext cx="9494057" cy="3496036"/>
+          </a:xfrm>
+          <a:prstGeom prst="rect">
+            <a:avLst/>
+          </a:prstGeom>
+        </p:spPr>
+      </p:pic>
+    </p:spTree>
+    <p:extLst>
+      <p:ext uri="{BB962C8B-B14F-4D97-AF65-F5344CB8AC3E}">
+        <p14:creationId xmlns:p14="http://schemas.microsoft.com/office/powerpoint/2010/main" val="3475361317"/>
+      </p:ext>
+    </p:extLst>
+  </p:cSld>
+  <p:clrMapOvr>
+    <a:masterClrMapping/>
+  </p:clrMapOvr>
+</p:sld>
+</file>
+
+<file path=ppt/slides/slide6.xml><?xml version="1.0" encoding="utf-8"?>
+<p:sld xmlns:a="http://schemas.openxmlformats.org/drawingml/2006/main" xmlns:r="http://schemas.openxmlformats.org/officeDocument/2006/relationships" xmlns:p="http://schemas.openxmlformats.org/presentationml/2006/main">
+  <p:cSld>
+    <p:spTree>
+      <p:nvGrpSpPr>
+        <p:cNvPr id="1" name="">
+          <a:extLst>
+            <a:ext uri="{FF2B5EF4-FFF2-40B4-BE49-F238E27FC236}">
+              <a16:creationId xmlns:a16="http://schemas.microsoft.com/office/drawing/2014/main" id="{7663A0E7-1DC6-6F05-8257-92DC862C0F36}"/>
+            </a:ext>
+          </a:extLst>
+        </p:cNvPr>
+        <p:cNvGrpSpPr/>
+        <p:nvPr/>
+      </p:nvGrpSpPr>
+      <p:grpSpPr>
+        <a:xfrm>
+          <a:off x="0" y="0"/>
+          <a:ext cx="0" cy="0"/>
+          <a:chOff x="0" y="0"/>
+          <a:chExt cx="0" cy="0"/>
+        </a:xfrm>
+      </p:grpSpPr>
+      <p:sp>
+        <p:nvSpPr>
+          <p:cNvPr id="2" name="Title 1">
+            <a:extLst>
+              <a:ext uri="{FF2B5EF4-FFF2-40B4-BE49-F238E27FC236}">
+                <a16:creationId xmlns:a16="http://schemas.microsoft.com/office/drawing/2014/main" id="{2EB8834A-469F-B8CF-CDD8-37E4BD5E76F0}"/>
+              </a:ext>
+            </a:extLst>
+          </p:cNvPr>
+          <p:cNvSpPr>
+            <a:spLocks noGrp="1"/>
+          </p:cNvSpPr>
+          <p:nvPr>
+            <p:ph type="ctrTitle"/>
+          </p:nvPr>
+        </p:nvSpPr>
+        <p:spPr>
+          <a:xfrm>
+            <a:off x="1431403" y="416307"/>
+            <a:ext cx="9144000" cy="868483"/>
+          </a:xfrm>
+        </p:spPr>
+        <p:txBody>
+          <a:bodyPr>
+            <a:normAutofit fontScale="90000"/>
+          </a:bodyPr>
+          <a:lstStyle/>
+          <a:p>
+            <a:r>
+              <a:rPr lang="en-CL"/>
+              <a:t>AGENDA CASPTONE</a:t>
+            </a:r>
+          </a:p>
+        </p:txBody>
+      </p:sp>
+      <p:sp>
+        <p:nvSpPr>
+          <p:cNvPr id="3" name="Subtitle 2">
+            <a:extLst>
+              <a:ext uri="{FF2B5EF4-FFF2-40B4-BE49-F238E27FC236}">
+                <a16:creationId xmlns:a16="http://schemas.microsoft.com/office/drawing/2014/main" id="{E2A78080-21F8-B467-B97D-FF467CB7EAA5}"/>
+              </a:ext>
+            </a:extLst>
+          </p:cNvPr>
+          <p:cNvSpPr>
+            <a:spLocks noGrp="1"/>
+          </p:cNvSpPr>
+          <p:nvPr>
+            <p:ph type="subTitle" idx="1"/>
+          </p:nvPr>
+        </p:nvSpPr>
+        <p:spPr>
+          <a:xfrm>
+            <a:off x="1524000" y="1562582"/>
+            <a:ext cx="9144000" cy="4409955"/>
+          </a:xfrm>
+        </p:spPr>
+        <p:txBody>
+          <a:bodyPr>
+            <a:normAutofit/>
+          </a:bodyPr>
+          <a:lstStyle/>
+          <a:p>
+            <a:pPr algn="l"/>
+            <a:r>
+              <a:rPr lang="es-ES_tradnl" b="1" i="0" u="none" strike="noStrike" dirty="0">
+                <a:solidFill>
+                  <a:srgbClr val="444444"/>
+                </a:solidFill>
+                <a:effectLst/>
+                <a:latin typeface="Arial" panose="020B0604020202020204" pitchFamily="34" charset="0"/>
+              </a:rPr>
+              <a:t>Segunda parte:</a:t>
+            </a:r>
+            <a:r>
+              <a:rPr lang="es-ES_tradnl" b="0" i="0" u="none" strike="noStrike" dirty="0">
+                <a:solidFill>
+                  <a:srgbClr val="444444"/>
+                </a:solidFill>
+                <a:effectLst/>
+                <a:latin typeface="Arial" panose="020B0604020202020204" pitchFamily="34" charset="0"/>
+              </a:rPr>
+              <a:t> </a:t>
+            </a:r>
+          </a:p>
+          <a:p>
+            <a:pPr algn="l"/>
+            <a:r>
+              <a:rPr lang="es-ES_tradnl" b="0" i="0" u="none" strike="noStrike" dirty="0">
+                <a:solidFill>
+                  <a:srgbClr val="444444"/>
+                </a:solidFill>
+                <a:effectLst/>
+                <a:latin typeface="Arial" panose="020B0604020202020204" pitchFamily="34" charset="0"/>
+              </a:rPr>
+              <a:t>Hipótesis (Preguntas de investigación)  +  Objetivos +  Descripción de los Datos Metodología, </a:t>
+            </a:r>
+            <a:r>
+              <a:rPr lang="es-ES_tradnl" b="0" i="0" u="none" strike="noStrike" dirty="0" err="1">
+                <a:solidFill>
+                  <a:srgbClr val="444444"/>
+                </a:solidFill>
+                <a:effectLst/>
+                <a:latin typeface="Arial" panose="020B0604020202020204" pitchFamily="34" charset="0"/>
+              </a:rPr>
+              <a:t>Exploratory</a:t>
+            </a:r>
+            <a:r>
+              <a:rPr lang="es-ES_tradnl" b="0" i="0" u="none" strike="noStrike" dirty="0">
+                <a:solidFill>
+                  <a:srgbClr val="444444"/>
+                </a:solidFill>
+                <a:effectLst/>
+                <a:latin typeface="Arial" panose="020B0604020202020204" pitchFamily="34" charset="0"/>
+              </a:rPr>
+              <a:t> Data </a:t>
+            </a:r>
+            <a:r>
+              <a:rPr lang="es-ES_tradnl" b="0" i="0" u="none" strike="noStrike" dirty="0" err="1">
+                <a:solidFill>
+                  <a:srgbClr val="444444"/>
+                </a:solidFill>
+                <a:effectLst/>
+                <a:latin typeface="Arial" panose="020B0604020202020204" pitchFamily="34" charset="0"/>
+              </a:rPr>
+              <a:t>Analysis</a:t>
+            </a:r>
+            <a:r>
+              <a:rPr lang="es-ES_tradnl" b="0" i="0" u="none" strike="noStrike" dirty="0">
+                <a:solidFill>
+                  <a:srgbClr val="444444"/>
+                </a:solidFill>
+                <a:effectLst/>
+                <a:latin typeface="Arial" panose="020B0604020202020204" pitchFamily="34" charset="0"/>
+              </a:rPr>
+              <a:t>, Modelos       (5 minutos)</a:t>
+            </a:r>
+          </a:p>
+          <a:p>
+            <a:pPr algn="l"/>
+            <a:endParaRPr lang="es-ES_tradnl" b="0" i="0" u="none" strike="noStrike" dirty="0">
+              <a:solidFill>
+                <a:srgbClr val="444444"/>
+              </a:solidFill>
+              <a:effectLst/>
+              <a:latin typeface="Arial" panose="020B0604020202020204" pitchFamily="34" charset="0"/>
+            </a:endParaRPr>
+          </a:p>
+          <a:p>
+            <a:pPr algn="l"/>
+            <a:r>
+              <a:rPr lang="es-ES_tradnl" b="0" i="0" u="none" strike="noStrike" dirty="0">
+                <a:solidFill>
+                  <a:srgbClr val="444444"/>
+                </a:solidFill>
+                <a:effectLst/>
+                <a:latin typeface="Arial" panose="020B0604020202020204" pitchFamily="34" charset="0"/>
+              </a:rPr>
+              <a:t>                           </a:t>
+            </a:r>
+          </a:p>
+          <a:p>
+            <a:pPr algn="l"/>
+            <a:r>
+              <a:rPr lang="es-ES_tradnl" b="0" i="0" u="none" strike="noStrike" dirty="0">
+                <a:solidFill>
+                  <a:srgbClr val="444444"/>
+                </a:solidFill>
+                <a:effectLst/>
+                <a:latin typeface="Arial" panose="020B0604020202020204" pitchFamily="34" charset="0"/>
+              </a:rPr>
+              <a:t>              </a:t>
+            </a:r>
+          </a:p>
+          <a:p>
+            <a:pPr algn="l"/>
+            <a:endParaRPr lang="es-ES_tradnl" dirty="0"/>
+          </a:p>
+        </p:txBody>
+      </p:sp>
+    </p:spTree>
+    <p:extLst>
+      <p:ext uri="{BB962C8B-B14F-4D97-AF65-F5344CB8AC3E}">
+        <p14:creationId xmlns:p14="http://schemas.microsoft.com/office/powerpoint/2010/main" val="2596410962"/>
+      </p:ext>
+    </p:extLst>
+  </p:cSld>
+  <p:clrMapOvr>
+    <a:masterClrMapping/>
+  </p:clrMapOvr>
+</p:sld>
+</file>
+
+<file path=ppt/slides/slide7.xml><?xml version="1.0" encoding="utf-8"?>
+<p:sld xmlns:a="http://schemas.openxmlformats.org/drawingml/2006/main" xmlns:r="http://schemas.openxmlformats.org/officeDocument/2006/relationships" xmlns:p="http://schemas.openxmlformats.org/presentationml/2006/main">
+  <p:cSld>
+    <p:spTree>
+      <p:nvGrpSpPr>
+        <p:cNvPr id="1" name="">
+          <a:extLst>
+            <a:ext uri="{FF2B5EF4-FFF2-40B4-BE49-F238E27FC236}">
+              <a16:creationId xmlns:a16="http://schemas.microsoft.com/office/drawing/2014/main" id="{535F4F61-AE3E-00A7-84AE-E40A943AA4E1}"/>
+            </a:ext>
+          </a:extLst>
+        </p:cNvPr>
+        <p:cNvGrpSpPr/>
+        <p:nvPr/>
+      </p:nvGrpSpPr>
+      <p:grpSpPr>
+        <a:xfrm>
+          <a:off x="0" y="0"/>
+          <a:ext cx="0" cy="0"/>
+          <a:chOff x="0" y="0"/>
+          <a:chExt cx="0" cy="0"/>
+        </a:xfrm>
+      </p:grpSpPr>
+      <p:sp>
+        <p:nvSpPr>
+          <p:cNvPr id="2" name="Title 1">
+            <a:extLst>
+              <a:ext uri="{FF2B5EF4-FFF2-40B4-BE49-F238E27FC236}">
+                <a16:creationId xmlns:a16="http://schemas.microsoft.com/office/drawing/2014/main" id="{0C09F1AB-4D70-4748-49A9-77F36D07103C}"/>
+              </a:ext>
+            </a:extLst>
+          </p:cNvPr>
+          <p:cNvSpPr>
+            <a:spLocks noGrp="1"/>
+          </p:cNvSpPr>
+          <p:nvPr>
+            <p:ph type="ctrTitle"/>
+          </p:nvPr>
+        </p:nvSpPr>
+        <p:spPr>
+          <a:xfrm>
+            <a:off x="1431403" y="416307"/>
+            <a:ext cx="9144000" cy="868483"/>
+          </a:xfrm>
+        </p:spPr>
+        <p:txBody>
+          <a:bodyPr>
+            <a:normAutofit fontScale="90000"/>
+          </a:bodyPr>
+          <a:lstStyle/>
+          <a:p>
+            <a:r>
+              <a:rPr lang="en-CL"/>
+              <a:t>AGENDA CASPTONE</a:t>
+            </a:r>
+          </a:p>
+        </p:txBody>
+      </p:sp>
+      <p:sp>
+        <p:nvSpPr>
+          <p:cNvPr id="3" name="Subtitle 2">
+            <a:extLst>
+              <a:ext uri="{FF2B5EF4-FFF2-40B4-BE49-F238E27FC236}">
+                <a16:creationId xmlns:a16="http://schemas.microsoft.com/office/drawing/2014/main" id="{909124B6-E8E0-E08F-8FA5-022F4D3EDDC5}"/>
+              </a:ext>
+            </a:extLst>
+          </p:cNvPr>
+          <p:cNvSpPr>
+            <a:spLocks noGrp="1"/>
+          </p:cNvSpPr>
+          <p:nvPr>
+            <p:ph type="subTitle" idx="1"/>
+          </p:nvPr>
+        </p:nvSpPr>
+        <p:spPr>
+          <a:xfrm>
+            <a:off x="1524000" y="1562582"/>
+            <a:ext cx="9144000" cy="4409955"/>
+          </a:xfrm>
+        </p:spPr>
+        <p:txBody>
+          <a:bodyPr>
+            <a:normAutofit/>
+          </a:bodyPr>
+          <a:lstStyle/>
+          <a:p>
+            <a:pPr algn="l"/>
+            <a:r>
+              <a:rPr lang="es-ES_tradnl" b="1" i="0" u="none" strike="noStrike" dirty="0">
+                <a:solidFill>
+                  <a:srgbClr val="444444"/>
+                </a:solidFill>
+                <a:effectLst/>
+                <a:latin typeface="Arial" panose="020B0604020202020204" pitchFamily="34" charset="0"/>
+              </a:rPr>
+              <a:t>Tercera parte:</a:t>
+            </a:r>
+            <a:r>
+              <a:rPr lang="es-ES_tradnl" b="0" i="0" u="none" strike="noStrike" dirty="0">
+                <a:solidFill>
+                  <a:srgbClr val="444444"/>
+                </a:solidFill>
+                <a:effectLst/>
+                <a:latin typeface="Arial" panose="020B0604020202020204" pitchFamily="34" charset="0"/>
+              </a:rPr>
+              <a:t>  </a:t>
+            </a:r>
+          </a:p>
+          <a:p>
+            <a:pPr algn="l"/>
+            <a:r>
+              <a:rPr lang="es-ES_tradnl" b="0" i="0" u="none" strike="noStrike" dirty="0">
+                <a:solidFill>
+                  <a:srgbClr val="444444"/>
+                </a:solidFill>
+                <a:effectLst/>
+                <a:latin typeface="Arial" panose="020B0604020202020204" pitchFamily="34" charset="0"/>
+              </a:rPr>
+              <a:t>Resultados y Alcances    (8minutos)</a:t>
+            </a:r>
+          </a:p>
+          <a:p>
+            <a:pPr algn="l"/>
+            <a:endParaRPr lang="es-ES_tradnl" dirty="0">
+              <a:solidFill>
+                <a:srgbClr val="444444"/>
+              </a:solidFill>
+              <a:latin typeface="Arial" panose="020B0604020202020204" pitchFamily="34" charset="0"/>
+            </a:endParaRPr>
+          </a:p>
+          <a:p>
+            <a:pPr algn="l"/>
+            <a:endParaRPr lang="es-ES_tradnl" dirty="0"/>
+          </a:p>
+        </p:txBody>
+      </p:sp>
+    </p:spTree>
+    <p:extLst>
+      <p:ext uri="{BB962C8B-B14F-4D97-AF65-F5344CB8AC3E}">
+        <p14:creationId xmlns:p14="http://schemas.microsoft.com/office/powerpoint/2010/main" val="1121820381"/>
+      </p:ext>
+    </p:extLst>
+  </p:cSld>
+  <p:clrMapOvr>
+    <a:masterClrMapping/>
+  </p:clrMapOvr>
+</p:sld>
+</file>
+
+<file path=ppt/slides/slide8.xml><?xml version="1.0" encoding="utf-8"?>
+<p:sld xmlns:a="http://schemas.openxmlformats.org/drawingml/2006/main" xmlns:r="http://schemas.openxmlformats.org/officeDocument/2006/relationships" xmlns:p="http://schemas.openxmlformats.org/presentationml/2006/main">
+  <p:cSld>
+    <p:spTree>
+      <p:nvGrpSpPr>
+        <p:cNvPr id="1" name="">
+          <a:extLst>
+            <a:ext uri="{FF2B5EF4-FFF2-40B4-BE49-F238E27FC236}">
+              <a16:creationId xmlns:a16="http://schemas.microsoft.com/office/drawing/2014/main" id="{90A67E9D-BFD8-F7F9-2375-4A3CC27EBEDA}"/>
+            </a:ext>
+          </a:extLst>
+        </p:cNvPr>
+        <p:cNvGrpSpPr/>
+        <p:nvPr/>
+      </p:nvGrpSpPr>
+      <p:grpSpPr>
+        <a:xfrm>
+          <a:off x="0" y="0"/>
+          <a:ext cx="0" cy="0"/>
+          <a:chOff x="0" y="0"/>
+          <a:chExt cx="0" cy="0"/>
+        </a:xfrm>
+      </p:grpSpPr>
+      <p:sp>
+        <p:nvSpPr>
+          <p:cNvPr id="2" name="Title 1">
+            <a:extLst>
+              <a:ext uri="{FF2B5EF4-FFF2-40B4-BE49-F238E27FC236}">
+                <a16:creationId xmlns:a16="http://schemas.microsoft.com/office/drawing/2014/main" id="{872141A0-41BA-7BDD-B7CE-FB47716C8432}"/>
+              </a:ext>
+            </a:extLst>
+          </p:cNvPr>
+          <p:cNvSpPr>
+            <a:spLocks noGrp="1"/>
+          </p:cNvSpPr>
+          <p:nvPr>
+            <p:ph type="ctrTitle"/>
+          </p:nvPr>
+        </p:nvSpPr>
+        <p:spPr>
+          <a:xfrm>
+            <a:off x="1431403" y="416307"/>
+            <a:ext cx="9144000" cy="868483"/>
+          </a:xfrm>
+        </p:spPr>
+        <p:txBody>
+          <a:bodyPr>
+            <a:normAutofit fontScale="90000"/>
+          </a:bodyPr>
+          <a:lstStyle/>
+          <a:p>
+            <a:r>
+              <a:rPr lang="en-CL"/>
+              <a:t>AGENDA CASPTONE</a:t>
+            </a:r>
+          </a:p>
+        </p:txBody>
+      </p:sp>
+      <p:sp>
+        <p:nvSpPr>
+          <p:cNvPr id="3" name="Subtitle 2">
+            <a:extLst>
+              <a:ext uri="{FF2B5EF4-FFF2-40B4-BE49-F238E27FC236}">
+                <a16:creationId xmlns:a16="http://schemas.microsoft.com/office/drawing/2014/main" id="{1517C30F-A41D-6DF7-3909-1F5515D67AE4}"/>
+              </a:ext>
+            </a:extLst>
+          </p:cNvPr>
+          <p:cNvSpPr>
+            <a:spLocks noGrp="1"/>
+          </p:cNvSpPr>
+          <p:nvPr>
+            <p:ph type="subTitle" idx="1"/>
+          </p:nvPr>
+        </p:nvSpPr>
+        <p:spPr>
+          <a:xfrm>
+            <a:off x="1524000" y="1562582"/>
+            <a:ext cx="9144000" cy="4409955"/>
+          </a:xfrm>
+        </p:spPr>
+        <p:txBody>
+          <a:bodyPr>
+            <a:normAutofit/>
+          </a:bodyPr>
+          <a:lstStyle/>
+          <a:p>
+            <a:pPr algn="l"/>
+            <a:r>
+              <a:rPr lang="es-ES_tradnl" b="1" i="0" u="none" strike="noStrike" dirty="0">
+                <a:solidFill>
+                  <a:srgbClr val="444444"/>
+                </a:solidFill>
+                <a:effectLst/>
+                <a:latin typeface="Arial" panose="020B0604020202020204" pitchFamily="34" charset="0"/>
+              </a:rPr>
+              <a:t>Cuarta parte:</a:t>
+            </a:r>
+            <a:r>
+              <a:rPr lang="es-ES_tradnl" b="0" i="0" u="none" strike="noStrike" dirty="0">
+                <a:solidFill>
+                  <a:srgbClr val="444444"/>
+                </a:solidFill>
+                <a:effectLst/>
+                <a:latin typeface="Arial" panose="020B0604020202020204" pitchFamily="34" charset="0"/>
+              </a:rPr>
+              <a:t> </a:t>
+            </a:r>
+          </a:p>
+          <a:p>
+            <a:pPr algn="l"/>
+            <a:r>
+              <a:rPr lang="es-ES_tradnl" b="0" i="0" u="none" strike="noStrike" dirty="0">
+                <a:solidFill>
+                  <a:srgbClr val="444444"/>
+                </a:solidFill>
+                <a:effectLst/>
+                <a:latin typeface="Arial" panose="020B0604020202020204" pitchFamily="34" charset="0"/>
+              </a:rPr>
+              <a:t>Conclusiones + Discusión + Limitaciones  + Trabajo Futuro  (3 minutos)                                 </a:t>
+            </a:r>
+          </a:p>
+          <a:p>
+            <a:pPr algn="l"/>
+            <a:r>
+              <a:rPr lang="es-ES_tradnl" b="0" i="0" u="none" strike="noStrike" dirty="0">
+                <a:solidFill>
+                  <a:srgbClr val="444444"/>
+                </a:solidFill>
+                <a:effectLst/>
+                <a:latin typeface="Arial" panose="020B0604020202020204" pitchFamily="34" charset="0"/>
+              </a:rPr>
+              <a:t>              </a:t>
+            </a:r>
+          </a:p>
+          <a:p>
+            <a:pPr algn="l"/>
+            <a:endParaRPr lang="es-ES_tradnl" dirty="0"/>
+          </a:p>
+        </p:txBody>
+      </p:sp>
+    </p:spTree>
+    <p:extLst>
+      <p:ext uri="{BB962C8B-B14F-4D97-AF65-F5344CB8AC3E}">
+        <p14:creationId xmlns:p14="http://schemas.microsoft.com/office/powerpoint/2010/main" val="2881079769"/>
       </p:ext>
     </p:extLst>
   </p:cSld>
@@ -4479,4 +7030,319 @@
     </a:ext>
   </a:extLst>
 </a:theme>
+</file>
+
+<file path=ppt/theme/theme2.xml><?xml version="1.0" encoding="utf-8"?>
+<a:theme xmlns:a="http://schemas.openxmlformats.org/drawingml/2006/main" name="Office Theme">
+  <a:themeElements>
+    <a:clrScheme name="Office">
+      <a:dk1>
+        <a:sysClr val="windowText" lastClr="000000"/>
+      </a:dk1>
+      <a:lt1>
+        <a:sysClr val="window" lastClr="FFFFFF"/>
+      </a:lt1>
+      <a:dk2>
+        <a:srgbClr val="0E2841"/>
+      </a:dk2>
+      <a:lt2>
+        <a:srgbClr val="E8E8E8"/>
+      </a:lt2>
+      <a:accent1>
+        <a:srgbClr val="156082"/>
+      </a:accent1>
+      <a:accent2>
+        <a:srgbClr val="E97132"/>
+      </a:accent2>
+      <a:accent3>
+        <a:srgbClr val="196B24"/>
+      </a:accent3>
+      <a:accent4>
+        <a:srgbClr val="0F9ED5"/>
+      </a:accent4>
+      <a:accent5>
+        <a:srgbClr val="A02B93"/>
+      </a:accent5>
+      <a:accent6>
+        <a:srgbClr val="4EA72E"/>
+      </a:accent6>
+      <a:hlink>
+        <a:srgbClr val="467886"/>
+      </a:hlink>
+      <a:folHlink>
+        <a:srgbClr val="96607D"/>
+      </a:folHlink>
+    </a:clrScheme>
+    <a:fontScheme name="Office">
+      <a:majorFont>
+        <a:latin typeface="Aptos Display" panose="02110004020202020204"/>
+        <a:ea typeface=""/>
+        <a:cs typeface=""/>
+        <a:font script="Jpan" typeface="游ゴシック Light"/>
+        <a:font script="Hang" typeface="맑은 고딕"/>
+        <a:font script="Hans" typeface="等线 Light"/>
+        <a:font script="Hant" typeface="新細明體"/>
+        <a:font script="Arab" typeface="Times New Roman"/>
+        <a:font script="Hebr" typeface="Times New Roman"/>
+        <a:font script="Thai" typeface="Angsana New"/>
+        <a:font script="Ethi" typeface="Nyala"/>
+        <a:font script="Beng" typeface="Vrinda"/>
+        <a:font script="Gujr" typeface="Shruti"/>
+        <a:font script="Khmr" typeface="MoolBoran"/>
+        <a:font script="Knda" typeface="Tunga"/>
+        <a:font script="Guru" typeface="Raavi"/>
+        <a:font script="Cans" typeface="Euphemia"/>
+        <a:font script="Cher" typeface="Plantagenet Cherokee"/>
+        <a:font script="Yiii" typeface="Microsoft Yi Baiti"/>
+        <a:font script="Tibt" typeface="Microsoft Himalaya"/>
+        <a:font script="Thaa" typeface="MV Boli"/>
+        <a:font script="Deva" typeface="Mangal"/>
+        <a:font script="Telu" typeface="Gautami"/>
+        <a:font script="Taml" typeface="Latha"/>
+        <a:font script="Syrc" typeface="Estrangelo Edessa"/>
+        <a:font script="Orya" typeface="Kalinga"/>
+        <a:font script="Mlym" typeface="Kartika"/>
+        <a:font script="Laoo" typeface="DokChampa"/>
+        <a:font script="Sinh" typeface="Iskoola Pota"/>
+        <a:font script="Mong" typeface="Mongolian Baiti"/>
+        <a:font script="Viet" typeface="Times New Roman"/>
+        <a:font script="Uigh" typeface="Microsoft Uighur"/>
+        <a:font script="Geor" typeface="Sylfaen"/>
+        <a:font script="Armn" typeface="Arial"/>
+        <a:font script="Bugi" typeface="Leelawadee UI"/>
+        <a:font script="Bopo" typeface="Microsoft JhengHei"/>
+        <a:font script="Java" typeface="Javanese Text"/>
+        <a:font script="Lisu" typeface="Segoe UI"/>
+        <a:font script="Mymr" typeface="Myanmar Text"/>
+        <a:font script="Nkoo" typeface="Ebrima"/>
+        <a:font script="Olck" typeface="Nirmala UI"/>
+        <a:font script="Osma" typeface="Ebrima"/>
+        <a:font script="Phag" typeface="Phagspa"/>
+        <a:font script="Syrn" typeface="Estrangelo Edessa"/>
+        <a:font script="Syrj" typeface="Estrangelo Edessa"/>
+        <a:font script="Syre" typeface="Estrangelo Edessa"/>
+        <a:font script="Sora" typeface="Nirmala UI"/>
+        <a:font script="Tale" typeface="Microsoft Tai Le"/>
+        <a:font script="Talu" typeface="Microsoft New Tai Lue"/>
+        <a:font script="Tfng" typeface="Ebrima"/>
+      </a:majorFont>
+      <a:minorFont>
+        <a:latin typeface="Aptos" panose="02110004020202020204"/>
+        <a:ea typeface=""/>
+        <a:cs typeface=""/>
+        <a:font script="Jpan" typeface="游ゴシック"/>
+        <a:font script="Hang" typeface="맑은 고딕"/>
+        <a:font script="Hans" typeface="等线"/>
+        <a:font script="Hant" typeface="新細明體"/>
+        <a:font script="Arab" typeface="Arial"/>
+        <a:font script="Hebr" typeface="Arial"/>
+        <a:font script="Thai" typeface="Cordia New"/>
+        <a:font script="Ethi" typeface="Nyala"/>
+        <a:font script="Beng" typeface="Vrinda"/>
+        <a:font script="Gujr" typeface="Shruti"/>
+        <a:font script="Khmr" typeface="DaunPenh"/>
+        <a:font script="Knda" typeface="Tunga"/>
+        <a:font script="Guru" typeface="Raavi"/>
+        <a:font script="Cans" typeface="Euphemia"/>
+        <a:font script="Cher" typeface="Plantagenet Cherokee"/>
+        <a:font script="Yiii" typeface="Microsoft Yi Baiti"/>
+        <a:font script="Tibt" typeface="Microsoft Himalaya"/>
+        <a:font script="Thaa" typeface="MV Boli"/>
+        <a:font script="Deva" typeface="Mangal"/>
+        <a:font script="Telu" typeface="Gautami"/>
+        <a:font script="Taml" typeface="Latha"/>
+        <a:font script="Syrc" typeface="Estrangelo Edessa"/>
+        <a:font script="Orya" typeface="Kalinga"/>
+        <a:font script="Mlym" typeface="Kartika"/>
+        <a:font script="Laoo" typeface="DokChampa"/>
+        <a:font script="Sinh" typeface="Iskoola Pota"/>
+        <a:font script="Mong" typeface="Mongolian Baiti"/>
+        <a:font script="Viet" typeface="Arial"/>
+        <a:font script="Uigh" typeface="Microsoft Uighur"/>
+        <a:font script="Geor" typeface="Sylfaen"/>
+        <a:font script="Armn" typeface="Arial"/>
+        <a:font script="Bugi" typeface="Leelawadee UI"/>
+        <a:font script="Bopo" typeface="Microsoft JhengHei"/>
+        <a:font script="Java" typeface="Javanese Text"/>
+        <a:font script="Lisu" typeface="Segoe UI"/>
+        <a:font script="Mymr" typeface="Myanmar Text"/>
+        <a:font script="Nkoo" typeface="Ebrima"/>
+        <a:font script="Olck" typeface="Nirmala UI"/>
+        <a:font script="Osma" typeface="Ebrima"/>
+        <a:font script="Phag" typeface="Phagspa"/>
+        <a:font script="Syrn" typeface="Estrangelo Edessa"/>
+        <a:font script="Syrj" typeface="Estrangelo Edessa"/>
+        <a:font script="Syre" typeface="Estrangelo Edessa"/>
+        <a:font script="Sora" typeface="Nirmala UI"/>
+        <a:font script="Tale" typeface="Microsoft Tai Le"/>
+        <a:font script="Talu" typeface="Microsoft New Tai Lue"/>
+        <a:font script="Tfng" typeface="Ebrima"/>
+      </a:minorFont>
+    </a:fontScheme>
+    <a:fmtScheme name="Office">
+      <a:fillStyleLst>
+        <a:solidFill>
+          <a:schemeClr val="phClr"/>
+        </a:solidFill>
+        <a:gradFill rotWithShape="1">
+          <a:gsLst>
+            <a:gs pos="0">
+              <a:schemeClr val="phClr">
+                <a:lumMod val="110000"/>
+                <a:satMod val="105000"/>
+                <a:tint val="67000"/>
+              </a:schemeClr>
+            </a:gs>
+            <a:gs pos="50000">
+              <a:schemeClr val="phClr">
+                <a:lumMod val="105000"/>
+                <a:satMod val="103000"/>
+                <a:tint val="73000"/>
+              </a:schemeClr>
+            </a:gs>
+            <a:gs pos="100000">
+              <a:schemeClr val="phClr">
+                <a:lumMod val="105000"/>
+                <a:satMod val="109000"/>
+                <a:tint val="81000"/>
+              </a:schemeClr>
+            </a:gs>
+          </a:gsLst>
+          <a:lin ang="5400000" scaled="0"/>
+        </a:gradFill>
+        <a:gradFill rotWithShape="1">
+          <a:gsLst>
+            <a:gs pos="0">
+              <a:schemeClr val="phClr">
+                <a:satMod val="103000"/>
+                <a:lumMod val="102000"/>
+                <a:tint val="94000"/>
+              </a:schemeClr>
+            </a:gs>
+            <a:gs pos="50000">
+              <a:schemeClr val="phClr">
+                <a:satMod val="110000"/>
+                <a:lumMod val="100000"/>
+                <a:shade val="100000"/>
+              </a:schemeClr>
+            </a:gs>
+            <a:gs pos="100000">
+              <a:schemeClr val="phClr">
+                <a:lumMod val="99000"/>
+                <a:satMod val="120000"/>
+                <a:shade val="78000"/>
+              </a:schemeClr>
+            </a:gs>
+          </a:gsLst>
+          <a:lin ang="5400000" scaled="0"/>
+        </a:gradFill>
+      </a:fillStyleLst>
+      <a:lnStyleLst>
+        <a:ln w="12700" cap="flat" cmpd="sng" algn="ctr">
+          <a:solidFill>
+            <a:schemeClr val="phClr"/>
+          </a:solidFill>
+          <a:prstDash val="solid"/>
+          <a:miter lim="800000"/>
+        </a:ln>
+        <a:ln w="19050" cap="flat" cmpd="sng" algn="ctr">
+          <a:solidFill>
+            <a:schemeClr val="phClr"/>
+          </a:solidFill>
+          <a:prstDash val="solid"/>
+          <a:miter lim="800000"/>
+        </a:ln>
+        <a:ln w="25400" cap="flat" cmpd="sng" algn="ctr">
+          <a:solidFill>
+            <a:schemeClr val="phClr"/>
+          </a:solidFill>
+          <a:prstDash val="solid"/>
+          <a:miter lim="800000"/>
+        </a:ln>
+      </a:lnStyleLst>
+      <a:effectStyleLst>
+        <a:effectStyle>
+          <a:effectLst/>
+        </a:effectStyle>
+        <a:effectStyle>
+          <a:effectLst/>
+        </a:effectStyle>
+        <a:effectStyle>
+          <a:effectLst>
+            <a:outerShdw blurRad="57150" dist="19050" dir="5400000" algn="ctr" rotWithShape="0">
+              <a:srgbClr val="000000">
+                <a:alpha val="63000"/>
+              </a:srgbClr>
+            </a:outerShdw>
+          </a:effectLst>
+        </a:effectStyle>
+      </a:effectStyleLst>
+      <a:bgFillStyleLst>
+        <a:solidFill>
+          <a:schemeClr val="phClr"/>
+        </a:solidFill>
+        <a:solidFill>
+          <a:schemeClr val="phClr">
+            <a:tint val="95000"/>
+            <a:satMod val="170000"/>
+          </a:schemeClr>
+        </a:solidFill>
+        <a:gradFill rotWithShape="1">
+          <a:gsLst>
+            <a:gs pos="0">
+              <a:schemeClr val="phClr">
+                <a:tint val="93000"/>
+                <a:satMod val="150000"/>
+                <a:shade val="98000"/>
+                <a:lumMod val="102000"/>
+              </a:schemeClr>
+            </a:gs>
+            <a:gs pos="50000">
+              <a:schemeClr val="phClr">
+                <a:tint val="98000"/>
+                <a:satMod val="130000"/>
+                <a:shade val="90000"/>
+                <a:lumMod val="103000"/>
+              </a:schemeClr>
+            </a:gs>
+            <a:gs pos="100000">
+              <a:schemeClr val="phClr">
+                <a:shade val="63000"/>
+                <a:satMod val="120000"/>
+              </a:schemeClr>
+            </a:gs>
+          </a:gsLst>
+          <a:lin ang="5400000" scaled="0"/>
+        </a:gradFill>
+      </a:bgFillStyleLst>
+    </a:fmtScheme>
+  </a:themeElements>
+  <a:objectDefaults>
+    <a:lnDef>
+      <a:spPr/>
+      <a:bodyPr/>
+      <a:lstStyle/>
+      <a:style>
+        <a:lnRef idx="2">
+          <a:schemeClr val="accent1"/>
+        </a:lnRef>
+        <a:fillRef idx="0">
+          <a:schemeClr val="accent1"/>
+        </a:fillRef>
+        <a:effectRef idx="1">
+          <a:schemeClr val="accent1"/>
+        </a:effectRef>
+        <a:fontRef idx="minor">
+          <a:schemeClr val="tx1"/>
+        </a:fontRef>
+      </a:style>
+    </a:lnDef>
+  </a:objectDefaults>
+  <a:extraClrSchemeLst/>
+  <a:extLst>
+    <a:ext uri="{05A4C25C-085E-4340-85A3-A5531E510DB2}">
+      <thm15:themeFamily xmlns:thm15="http://schemas.microsoft.com/office/thememl/2012/main" name="Office Theme" id="{2E142A2C-CD16-42D6-873A-C26D2A0506FA}" vid="{1BDDFF52-6CD6-40A5-AB3C-68EB2F1E4D0A}"/>
+    </a:ext>
+  </a:extLst>
+</a:theme>
 </file>
</xml_diff>